<commit_message>
WEAP LEAP time step control test completed
</commit_message>
<xml_diff>
--- a/Step_Control_Test/WEAP_LEAP_Time_Step_Control.pptx
+++ b/Step_Control_Test/WEAP_LEAP_Time_Step_Control.pptx
@@ -5,24 +5,26 @@
     <p:sldMasterId id="2147483678" r:id="rId1"/>
   </p:sldMasterIdLst>
   <p:notesMasterIdLst>
-    <p:notesMasterId r:id="rId17"/>
+    <p:notesMasterId r:id="rId19"/>
   </p:notesMasterIdLst>
   <p:sldIdLst>
     <p:sldId id="320" r:id="rId2"/>
     <p:sldId id="329" r:id="rId3"/>
     <p:sldId id="330" r:id="rId4"/>
     <p:sldId id="331" r:id="rId5"/>
-    <p:sldId id="321" r:id="rId6"/>
-    <p:sldId id="332" r:id="rId7"/>
-    <p:sldId id="333" r:id="rId8"/>
-    <p:sldId id="322" r:id="rId9"/>
-    <p:sldId id="334" r:id="rId10"/>
-    <p:sldId id="335" r:id="rId11"/>
-    <p:sldId id="336" r:id="rId12"/>
-    <p:sldId id="337" r:id="rId13"/>
-    <p:sldId id="338" r:id="rId14"/>
-    <p:sldId id="339" r:id="rId15"/>
-    <p:sldId id="328" r:id="rId16"/>
+    <p:sldId id="340" r:id="rId6"/>
+    <p:sldId id="341" r:id="rId7"/>
+    <p:sldId id="321" r:id="rId8"/>
+    <p:sldId id="332" r:id="rId9"/>
+    <p:sldId id="333" r:id="rId10"/>
+    <p:sldId id="322" r:id="rId11"/>
+    <p:sldId id="334" r:id="rId12"/>
+    <p:sldId id="335" r:id="rId13"/>
+    <p:sldId id="336" r:id="rId14"/>
+    <p:sldId id="337" r:id="rId15"/>
+    <p:sldId id="338" r:id="rId16"/>
+    <p:sldId id="339" r:id="rId17"/>
+    <p:sldId id="328" r:id="rId18"/>
   </p:sldIdLst>
   <p:sldSz cx="12192000" cy="6858000"/>
   <p:notesSz cx="6858000" cy="9144000"/>
@@ -223,7 +225,7 @@
           <a:p>
             <a:fld id="{C0FD841D-3CEA-41B6-B502-4A06C24D4491}" type="datetimeFigureOut">
               <a:rPr lang="en-US" smtClean="0"/>
-              <a:t>9/27/2019</a:t>
+              <a:t>9/29/2019</a:t>
             </a:fld>
             <a:endParaRPr lang="en-US"/>
           </a:p>
@@ -536,7 +538,7 @@
               </a14:hiddenFill>
             </a:ext>
             <a:ext uri="{FAA26D3D-D897-4be2-8F04-BA451C77F1D7}">
-              <ma14:placeholderFlag xmlns:ma14="http://schemas.microsoft.com/office/mac/drawingml/2011/main" xmlns="" val="1"/>
+              <ma14:placeholderFlag xmlns="" xmlns:ma14="http://schemas.microsoft.com/office/mac/drawingml/2011/main" val="1"/>
             </a:ext>
           </a:extLst>
         </p:spPr>
@@ -572,7 +574,7 @@
               </a14:hiddenLine>
             </a:ext>
             <a:ext uri="{FAA26D3D-D897-4be2-8F04-BA451C77F1D7}">
-              <ma14:placeholderFlag xmlns:ma14="http://schemas.microsoft.com/office/mac/drawingml/2011/main" xmlns="" val="1"/>
+              <ma14:placeholderFlag xmlns="" xmlns:ma14="http://schemas.microsoft.com/office/mac/drawingml/2011/main" val="1"/>
             </a:ext>
           </a:extLst>
         </p:spPr>
@@ -4373,6 +4375,35 @@
           </a:p>
         </p:txBody>
       </p:sp>
+      <p:sp>
+        <p:nvSpPr>
+          <p:cNvPr id="7" name="Slide Number Placeholder 4"/>
+          <p:cNvSpPr>
+            <a:spLocks noGrp="1"/>
+          </p:cNvSpPr>
+          <p:nvPr>
+            <p:ph type="sldNum" sz="quarter" idx="12"/>
+          </p:nvPr>
+        </p:nvSpPr>
+        <p:spPr>
+          <a:xfrm>
+            <a:off x="8610600" y="6356350"/>
+            <a:ext cx="2743200" cy="365125"/>
+          </a:xfrm>
+        </p:spPr>
+        <p:txBody>
+          <a:bodyPr/>
+          <a:lstStyle/>
+          <a:p>
+            <a:fld id="{90F3C78D-3DB8-C64C-BA66-FD220ADFD702}" type="slidenum">
+              <a:rPr lang="en-US" smtClean="0"/>
+              <a:pPr/>
+              <a:t>1</a:t>
+            </a:fld>
+            <a:endParaRPr lang="en-US" dirty="0"/>
+          </a:p>
+        </p:txBody>
+      </p:sp>
     </p:spTree>
     <p:extLst>
       <p:ext uri="{BB962C8B-B14F-4D97-AF65-F5344CB8AC3E}">
@@ -4481,11 +4512,36 @@
               <a:rPr lang="en-US" sz="2800" dirty="0" smtClean="0"/>
               <a:t>Constrained Link Test</a:t>
             </a:r>
-            <a:r>
-              <a:rPr lang="en-US" sz="3200" dirty="0" smtClean="0"/>
-              <a:t> </a:t>
-            </a:r>
             <a:endParaRPr lang="en-US" sz="3200" dirty="0"/>
+          </a:p>
+        </p:txBody>
+      </p:sp>
+      <p:sp>
+        <p:nvSpPr>
+          <p:cNvPr id="7" name="Rectangle 6"/>
+          <p:cNvSpPr/>
+          <p:nvPr/>
+        </p:nvSpPr>
+        <p:spPr>
+          <a:xfrm>
+            <a:off x="677163" y="881094"/>
+            <a:ext cx="1200072" cy="369332"/>
+          </a:xfrm>
+          <a:prstGeom prst="rect">
+            <a:avLst/>
+          </a:prstGeom>
+        </p:spPr>
+        <p:txBody>
+          <a:bodyPr wrap="none">
+            <a:spAutoFit/>
+          </a:bodyPr>
+          <a:lstStyle/>
+          <a:p>
+            <a:r>
+              <a:rPr lang="en-US" dirty="0" smtClean="0"/>
+              <a:t>1.    WEAP:</a:t>
+            </a:r>
+            <a:endParaRPr lang="en-US" dirty="0"/>
           </a:p>
         </p:txBody>
       </p:sp>
@@ -4511,8 +4567,8 @@
         </p:blipFill>
         <p:spPr>
           <a:xfrm>
-            <a:off x="519222" y="914708"/>
-            <a:ext cx="3513102" cy="2634827"/>
+            <a:off x="845127" y="1340874"/>
+            <a:ext cx="3155469" cy="2366602"/>
           </a:xfrm>
           <a:prstGeom prst="rect">
             <a:avLst/>
@@ -4541,8 +4597,8 @@
         </p:blipFill>
         <p:spPr>
           <a:xfrm>
-            <a:off x="4228408" y="943495"/>
-            <a:ext cx="3474720" cy="2606040"/>
+            <a:off x="4222865" y="1340874"/>
+            <a:ext cx="3155470" cy="2366602"/>
           </a:xfrm>
           <a:prstGeom prst="rect">
             <a:avLst/>
@@ -4571,8 +4627,8 @@
         </p:blipFill>
         <p:spPr>
           <a:xfrm>
-            <a:off x="7941288" y="966823"/>
-            <a:ext cx="3412512" cy="2559384"/>
+            <a:off x="7711439" y="1315095"/>
+            <a:ext cx="3189842" cy="2392381"/>
           </a:xfrm>
           <a:prstGeom prst="rect">
             <a:avLst/>
@@ -4581,7 +4637,7 @@
       </p:pic>
       <p:pic>
         <p:nvPicPr>
-          <p:cNvPr id="9" name="Picture 8"/>
+          <p:cNvPr id="10" name="Picture 9"/>
           <p:cNvPicPr>
             <a:picLocks noChangeAspect="1"/>
           </p:cNvPicPr>
@@ -4601,8 +4657,8 @@
         </p:blipFill>
         <p:spPr>
           <a:xfrm>
-            <a:off x="435684" y="3841432"/>
-            <a:ext cx="3596640" cy="2697480"/>
+            <a:off x="677163" y="4151081"/>
+            <a:ext cx="3183775" cy="2387831"/>
           </a:xfrm>
           <a:prstGeom prst="rect">
             <a:avLst/>
@@ -4611,7 +4667,7 @@
       </p:pic>
       <p:pic>
         <p:nvPicPr>
-          <p:cNvPr id="13" name="Picture 12"/>
+          <p:cNvPr id="11" name="Picture 10"/>
           <p:cNvPicPr>
             <a:picLocks noChangeAspect="1"/>
           </p:cNvPicPr>
@@ -4631,8 +4687,8 @@
         </p:blipFill>
         <p:spPr>
           <a:xfrm>
-            <a:off x="4228409" y="3841432"/>
-            <a:ext cx="3596640" cy="2697480"/>
+            <a:off x="4107530" y="4167706"/>
+            <a:ext cx="3153295" cy="2364971"/>
           </a:xfrm>
           <a:prstGeom prst="rect">
             <a:avLst/>
@@ -4641,7 +4697,7 @@
       </p:pic>
       <p:pic>
         <p:nvPicPr>
-          <p:cNvPr id="14" name="Picture 13"/>
+          <p:cNvPr id="12" name="Picture 11"/>
           <p:cNvPicPr>
             <a:picLocks noChangeAspect="1"/>
           </p:cNvPicPr>
@@ -4661,8 +4717,8 @@
         </p:blipFill>
         <p:spPr>
           <a:xfrm>
-            <a:off x="7941288" y="3879878"/>
-            <a:ext cx="3494116" cy="2620587"/>
+            <a:off x="7611091" y="4167706"/>
+            <a:ext cx="3175461" cy="2381596"/>
           </a:xfrm>
           <a:prstGeom prst="rect">
             <a:avLst/>
@@ -4672,7 +4728,7 @@
     </p:spTree>
     <p:extLst>
       <p:ext uri="{BB962C8B-B14F-4D97-AF65-F5344CB8AC3E}">
-        <p14:creationId xmlns:p14="http://schemas.microsoft.com/office/powerpoint/2010/main" val="2668810806"/>
+        <p14:creationId xmlns:p14="http://schemas.microsoft.com/office/powerpoint/2010/main" val="2331531519"/>
       </p:ext>
     </p:extLst>
   </p:cSld>
@@ -4750,8 +4806,12 @@
               <a:t>Test Result: </a:t>
             </a:r>
             <a:r>
+              <a:rPr lang="en-US" sz="2800" dirty="0"/>
+              <a:t>Unconstrained </a:t>
+            </a:r>
+            <a:r>
               <a:rPr lang="en-US" sz="2800" dirty="0" smtClean="0"/>
-              <a:t>Constrained Source </a:t>
+              <a:t>Source </a:t>
             </a:r>
             <a:r>
               <a:rPr lang="en-US" sz="2800" dirty="0"/>
@@ -4759,7 +4819,7 @@
             </a:r>
             <a:r>
               <a:rPr lang="en-US" sz="2800" dirty="0" smtClean="0"/>
-              <a:t>Unconstrained Link Test</a:t>
+              <a:t>Constrained Link Test</a:t>
             </a:r>
             <a:r>
               <a:rPr lang="en-US" sz="3200" dirty="0" smtClean="0"/>
@@ -4777,8 +4837,8 @@
         </p:nvSpPr>
         <p:spPr>
           <a:xfrm>
-            <a:off x="677163" y="881094"/>
-            <a:ext cx="1200072" cy="369332"/>
+            <a:off x="968107" y="3549263"/>
+            <a:ext cx="1092671" cy="369332"/>
           </a:xfrm>
           <a:prstGeom prst="rect">
             <a:avLst/>
@@ -4791,8 +4851,12 @@
           <a:lstStyle/>
           <a:p>
             <a:r>
+              <a:rPr lang="en-US" dirty="0"/>
+              <a:t>2</a:t>
+            </a:r>
+            <a:r>
               <a:rPr lang="en-US" dirty="0" smtClean="0"/>
-              <a:t>1.    WEAP:</a:t>
+              <a:t>.    LEAP:</a:t>
             </a:r>
             <a:endParaRPr lang="en-US" dirty="0"/>
           </a:p>
@@ -4820,8 +4884,8 @@
         </p:blipFill>
         <p:spPr>
           <a:xfrm>
-            <a:off x="519221" y="1340874"/>
-            <a:ext cx="3169064" cy="2376798"/>
+            <a:off x="590445" y="790646"/>
+            <a:ext cx="3208351" cy="2406263"/>
           </a:xfrm>
           <a:prstGeom prst="rect">
             <a:avLst/>
@@ -4850,8 +4914,8 @@
         </p:blipFill>
         <p:spPr>
           <a:xfrm>
-            <a:off x="3868292" y="1336077"/>
-            <a:ext cx="3175460" cy="2381595"/>
+            <a:off x="590445" y="4156275"/>
+            <a:ext cx="3117031" cy="2337773"/>
           </a:xfrm>
           <a:prstGeom prst="rect">
             <a:avLst/>
@@ -4860,7 +4924,7 @@
       </p:pic>
       <p:pic>
         <p:nvPicPr>
-          <p:cNvPr id="17" name="Picture 16"/>
+          <p:cNvPr id="13" name="Picture 12"/>
           <p:cNvPicPr>
             <a:picLocks noChangeAspect="1"/>
           </p:cNvPicPr>
@@ -4880,8 +4944,8 @@
         </p:blipFill>
         <p:spPr>
           <a:xfrm>
-            <a:off x="7281948" y="1336077"/>
-            <a:ext cx="3142211" cy="2356658"/>
+            <a:off x="3948546" y="4081548"/>
+            <a:ext cx="3216666" cy="2412499"/>
           </a:xfrm>
           <a:prstGeom prst="rect">
             <a:avLst/>
@@ -4890,7 +4954,7 @@
       </p:pic>
       <p:pic>
         <p:nvPicPr>
-          <p:cNvPr id="18" name="Picture 17"/>
+          <p:cNvPr id="14" name="Picture 13"/>
           <p:cNvPicPr>
             <a:picLocks noChangeAspect="1"/>
           </p:cNvPicPr>
@@ -4910,68 +4974,8 @@
         </p:blipFill>
         <p:spPr>
           <a:xfrm>
-            <a:off x="268722" y="3943581"/>
-            <a:ext cx="3217025" cy="2412769"/>
-          </a:xfrm>
-          <a:prstGeom prst="rect">
-            <a:avLst/>
-          </a:prstGeom>
-        </p:spPr>
-      </p:pic>
-      <p:pic>
-        <p:nvPicPr>
-          <p:cNvPr id="19" name="Picture 18"/>
-          <p:cNvPicPr>
-            <a:picLocks noChangeAspect="1"/>
-          </p:cNvPicPr>
-          <p:nvPr/>
-        </p:nvPicPr>
-        <p:blipFill>
-          <a:blip r:embed="rId6">
-            <a:extLst>
-              <a:ext uri="{28A0092B-C50C-407E-A947-70E740481C1C}">
-                <a14:useLocalDpi xmlns:a14="http://schemas.microsoft.com/office/drawing/2010/main" val="0"/>
-              </a:ext>
-            </a:extLst>
-          </a:blip>
-          <a:stretch>
-            <a:fillRect/>
-          </a:stretch>
-        </p:blipFill>
-        <p:spPr>
-          <a:xfrm>
-            <a:off x="3762894" y="3943581"/>
-            <a:ext cx="3186545" cy="2389909"/>
-          </a:xfrm>
-          <a:prstGeom prst="rect">
-            <a:avLst/>
-          </a:prstGeom>
-        </p:spPr>
-      </p:pic>
-      <p:pic>
-        <p:nvPicPr>
-          <p:cNvPr id="20" name="Picture 19"/>
-          <p:cNvPicPr>
-            <a:picLocks noChangeAspect="1"/>
-          </p:cNvPicPr>
-          <p:nvPr/>
-        </p:nvPicPr>
-        <p:blipFill>
-          <a:blip r:embed="rId7">
-            <a:extLst>
-              <a:ext uri="{28A0092B-C50C-407E-A947-70E740481C1C}">
-                <a14:useLocalDpi xmlns:a14="http://schemas.microsoft.com/office/drawing/2010/main" val="0"/>
-              </a:ext>
-            </a:extLst>
-          </a:blip>
-          <a:stretch>
-            <a:fillRect/>
-          </a:stretch>
-        </p:blipFill>
-        <p:spPr>
-          <a:xfrm>
-            <a:off x="7281948" y="3943580"/>
-            <a:ext cx="3186545" cy="2389909"/>
+            <a:off x="7406282" y="4081548"/>
+            <a:ext cx="3216666" cy="2412499"/>
           </a:xfrm>
           <a:prstGeom prst="rect">
             <a:avLst/>
@@ -4981,7 +4985,7 @@
     </p:spTree>
     <p:extLst>
       <p:ext uri="{BB962C8B-B14F-4D97-AF65-F5344CB8AC3E}">
-        <p14:creationId xmlns:p14="http://schemas.microsoft.com/office/powerpoint/2010/main" val="4268639796"/>
+        <p14:creationId xmlns:p14="http://schemas.microsoft.com/office/powerpoint/2010/main" val="3165310631"/>
       </p:ext>
     </p:extLst>
   </p:cSld>
@@ -5060,7 +5064,7 @@
             </a:r>
             <a:r>
               <a:rPr lang="en-US" sz="2800" dirty="0"/>
-              <a:t>Constrained </a:t>
+              <a:t>Unconstrained </a:t>
             </a:r>
             <a:r>
               <a:rPr lang="en-US" sz="2800" dirty="0" smtClean="0"/>
@@ -5068,53 +5072,17 @@
             </a:r>
             <a:r>
               <a:rPr lang="en-US" sz="2800" dirty="0"/>
-              <a:t>and Unconstrained </a:t>
+              <a:t>and </a:t>
             </a:r>
             <a:r>
               <a:rPr lang="en-US" sz="2800" dirty="0" smtClean="0"/>
-              <a:t>Link </a:t>
-            </a:r>
-            <a:r>
-              <a:rPr lang="en-US" sz="2800" dirty="0"/>
-              <a:t>Test</a:t>
-            </a:r>
-            <a:r>
-              <a:rPr lang="en-US" sz="3200" dirty="0"/>
+              <a:t>Constrained Link Test</a:t>
+            </a:r>
+            <a:r>
+              <a:rPr lang="en-US" sz="3200" dirty="0" smtClean="0"/>
               <a:t> </a:t>
             </a:r>
-          </a:p>
-        </p:txBody>
-      </p:sp>
-      <p:sp>
-        <p:nvSpPr>
-          <p:cNvPr id="7" name="Rectangle 6"/>
-          <p:cNvSpPr/>
-          <p:nvPr/>
-        </p:nvSpPr>
-        <p:spPr>
-          <a:xfrm>
-            <a:off x="951482" y="3412738"/>
-            <a:ext cx="1092671" cy="369332"/>
-          </a:xfrm>
-          <a:prstGeom prst="rect">
-            <a:avLst/>
-          </a:prstGeom>
-        </p:spPr>
-        <p:txBody>
-          <a:bodyPr wrap="none">
-            <a:spAutoFit/>
-          </a:bodyPr>
-          <a:lstStyle/>
-          <a:p>
-            <a:r>
-              <a:rPr lang="en-US" dirty="0"/>
-              <a:t>2</a:t>
-            </a:r>
-            <a:r>
-              <a:rPr lang="en-US" dirty="0" smtClean="0"/>
-              <a:t>.    LEAP:</a:t>
-            </a:r>
-            <a:endParaRPr lang="en-US" dirty="0"/>
+            <a:endParaRPr lang="en-US" sz="3200" dirty="0"/>
           </a:p>
         </p:txBody>
       </p:sp>
@@ -5140,8 +5108,8 @@
         </p:blipFill>
         <p:spPr>
           <a:xfrm>
-            <a:off x="590445" y="866121"/>
-            <a:ext cx="3045872" cy="2284404"/>
+            <a:off x="519222" y="914708"/>
+            <a:ext cx="3513102" cy="2634827"/>
           </a:xfrm>
           <a:prstGeom prst="rect">
             <a:avLst/>
@@ -5170,8 +5138,8 @@
         </p:blipFill>
         <p:spPr>
           <a:xfrm>
-            <a:off x="379621" y="3949468"/>
-            <a:ext cx="3352414" cy="2514311"/>
+            <a:off x="4228408" y="943495"/>
+            <a:ext cx="3474720" cy="2606040"/>
           </a:xfrm>
           <a:prstGeom prst="rect">
             <a:avLst/>
@@ -5200,8 +5168,8 @@
         </p:blipFill>
         <p:spPr>
           <a:xfrm>
-            <a:off x="3906981" y="3949468"/>
-            <a:ext cx="3394867" cy="2546150"/>
+            <a:off x="7941288" y="966823"/>
+            <a:ext cx="3412512" cy="2559384"/>
           </a:xfrm>
           <a:prstGeom prst="rect">
             <a:avLst/>
@@ -5210,7 +5178,7 @@
       </p:pic>
       <p:pic>
         <p:nvPicPr>
-          <p:cNvPr id="10" name="Picture 9"/>
+          <p:cNvPr id="9" name="Picture 8"/>
           <p:cNvPicPr>
             <a:picLocks noChangeAspect="1"/>
           </p:cNvPicPr>
@@ -5230,8 +5198,68 @@
         </p:blipFill>
         <p:spPr>
           <a:xfrm>
-            <a:off x="7761704" y="3949468"/>
-            <a:ext cx="3352414" cy="2514311"/>
+            <a:off x="435684" y="3841432"/>
+            <a:ext cx="3596640" cy="2697480"/>
+          </a:xfrm>
+          <a:prstGeom prst="rect">
+            <a:avLst/>
+          </a:prstGeom>
+        </p:spPr>
+      </p:pic>
+      <p:pic>
+        <p:nvPicPr>
+          <p:cNvPr id="13" name="Picture 12"/>
+          <p:cNvPicPr>
+            <a:picLocks noChangeAspect="1"/>
+          </p:cNvPicPr>
+          <p:nvPr/>
+        </p:nvPicPr>
+        <p:blipFill>
+          <a:blip r:embed="rId6">
+            <a:extLst>
+              <a:ext uri="{28A0092B-C50C-407E-A947-70E740481C1C}">
+                <a14:useLocalDpi xmlns:a14="http://schemas.microsoft.com/office/drawing/2010/main" val="0"/>
+              </a:ext>
+            </a:extLst>
+          </a:blip>
+          <a:stretch>
+            <a:fillRect/>
+          </a:stretch>
+        </p:blipFill>
+        <p:spPr>
+          <a:xfrm>
+            <a:off x="4228409" y="3841432"/>
+            <a:ext cx="3596640" cy="2697480"/>
+          </a:xfrm>
+          <a:prstGeom prst="rect">
+            <a:avLst/>
+          </a:prstGeom>
+        </p:spPr>
+      </p:pic>
+      <p:pic>
+        <p:nvPicPr>
+          <p:cNvPr id="14" name="Picture 13"/>
+          <p:cNvPicPr>
+            <a:picLocks noChangeAspect="1"/>
+          </p:cNvPicPr>
+          <p:nvPr/>
+        </p:nvPicPr>
+        <p:blipFill>
+          <a:blip r:embed="rId7">
+            <a:extLst>
+              <a:ext uri="{28A0092B-C50C-407E-A947-70E740481C1C}">
+                <a14:useLocalDpi xmlns:a14="http://schemas.microsoft.com/office/drawing/2010/main" val="0"/>
+              </a:ext>
+            </a:extLst>
+          </a:blip>
+          <a:stretch>
+            <a:fillRect/>
+          </a:stretch>
+        </p:blipFill>
+        <p:spPr>
+          <a:xfrm>
+            <a:off x="7941288" y="3879878"/>
+            <a:ext cx="3494116" cy="2620587"/>
           </a:xfrm>
           <a:prstGeom prst="rect">
             <a:avLst/>
@@ -5241,7 +5269,7 @@
     </p:spTree>
     <p:extLst>
       <p:ext uri="{BB962C8B-B14F-4D97-AF65-F5344CB8AC3E}">
-        <p14:creationId xmlns:p14="http://schemas.microsoft.com/office/powerpoint/2010/main" val="2860425268"/>
+        <p14:creationId xmlns:p14="http://schemas.microsoft.com/office/powerpoint/2010/main" val="2668810806"/>
       </p:ext>
     </p:extLst>
   </p:cSld>
@@ -5319,35 +5347,57 @@
               <a:t>Test Result: </a:t>
             </a:r>
             <a:r>
+              <a:rPr lang="en-US" sz="2800" dirty="0" smtClean="0"/>
+              <a:t>Constrained Source </a:t>
+            </a:r>
+            <a:r>
               <a:rPr lang="en-US" sz="2800" dirty="0"/>
-              <a:t>Constrained </a:t>
+              <a:t>and </a:t>
             </a:r>
             <a:r>
               <a:rPr lang="en-US" sz="2800" dirty="0" smtClean="0"/>
-              <a:t>Source </a:t>
-            </a:r>
-            <a:r>
-              <a:rPr lang="en-US" sz="2800" dirty="0"/>
-              <a:t>and Unconstrained </a:t>
-            </a:r>
-            <a:r>
-              <a:rPr lang="en-US" sz="2800" dirty="0" smtClean="0"/>
-              <a:t>Link </a:t>
-            </a:r>
-            <a:r>
-              <a:rPr lang="en-US" sz="2800" dirty="0"/>
-              <a:t>Test</a:t>
-            </a:r>
-            <a:r>
-              <a:rPr lang="en-US" sz="3200" dirty="0"/>
+              <a:t>Unconstrained Link Test</a:t>
+            </a:r>
+            <a:r>
+              <a:rPr lang="en-US" sz="3200" dirty="0" smtClean="0"/>
               <a:t> </a:t>
             </a:r>
+            <a:endParaRPr lang="en-US" sz="3200" dirty="0"/>
+          </a:p>
+        </p:txBody>
+      </p:sp>
+      <p:sp>
+        <p:nvSpPr>
+          <p:cNvPr id="7" name="Rectangle 6"/>
+          <p:cNvSpPr/>
+          <p:nvPr/>
+        </p:nvSpPr>
+        <p:spPr>
+          <a:xfrm>
+            <a:off x="677163" y="881094"/>
+            <a:ext cx="1200072" cy="369332"/>
+          </a:xfrm>
+          <a:prstGeom prst="rect">
+            <a:avLst/>
+          </a:prstGeom>
+        </p:spPr>
+        <p:txBody>
+          <a:bodyPr wrap="none">
+            <a:spAutoFit/>
+          </a:bodyPr>
+          <a:lstStyle/>
+          <a:p>
+            <a:r>
+              <a:rPr lang="en-US" dirty="0" smtClean="0"/>
+              <a:t>1.    WEAP:</a:t>
+            </a:r>
+            <a:endParaRPr lang="en-US" dirty="0"/>
           </a:p>
         </p:txBody>
       </p:sp>
       <p:pic>
         <p:nvPicPr>
-          <p:cNvPr id="3" name="Picture 2"/>
+          <p:cNvPr id="18" name="Picture 17"/>
           <p:cNvPicPr>
             <a:picLocks noChangeAspect="1"/>
           </p:cNvPicPr>
@@ -5367,8 +5417,8 @@
         </p:blipFill>
         <p:spPr>
           <a:xfrm>
-            <a:off x="519221" y="873144"/>
-            <a:ext cx="3513102" cy="2634827"/>
+            <a:off x="268722" y="3943581"/>
+            <a:ext cx="3217025" cy="2412769"/>
           </a:xfrm>
           <a:prstGeom prst="rect">
             <a:avLst/>
@@ -5377,7 +5427,7 @@
       </p:pic>
       <p:pic>
         <p:nvPicPr>
-          <p:cNvPr id="7" name="Picture 6"/>
+          <p:cNvPr id="19" name="Picture 18"/>
           <p:cNvPicPr>
             <a:picLocks noChangeAspect="1"/>
           </p:cNvPicPr>
@@ -5397,8 +5447,8 @@
         </p:blipFill>
         <p:spPr>
           <a:xfrm>
-            <a:off x="4263777" y="873144"/>
-            <a:ext cx="3513103" cy="2634827"/>
+            <a:off x="3762894" y="3943581"/>
+            <a:ext cx="3186545" cy="2389909"/>
           </a:xfrm>
           <a:prstGeom prst="rect">
             <a:avLst/>
@@ -5407,28 +5457,22 @@
       </p:pic>
       <p:pic>
         <p:nvPicPr>
-          <p:cNvPr id="10" name="Picture 9"/>
+          <p:cNvPr id="2" name="Picture 1"/>
           <p:cNvPicPr>
             <a:picLocks noChangeAspect="1"/>
           </p:cNvPicPr>
           <p:nvPr/>
         </p:nvPicPr>
         <p:blipFill>
-          <a:blip r:embed="rId4">
-            <a:extLst>
-              <a:ext uri="{28A0092B-C50C-407E-A947-70E740481C1C}">
-                <a14:useLocalDpi xmlns:a14="http://schemas.microsoft.com/office/drawing/2010/main" val="0"/>
-              </a:ext>
-            </a:extLst>
-          </a:blip>
+          <a:blip r:embed="rId4"/>
           <a:stretch>
             <a:fillRect/>
           </a:stretch>
         </p:blipFill>
         <p:spPr>
           <a:xfrm>
-            <a:off x="8008334" y="873145"/>
-            <a:ext cx="3513106" cy="2634830"/>
+            <a:off x="7281948" y="1258402"/>
+            <a:ext cx="3175081" cy="2381311"/>
           </a:xfrm>
           <a:prstGeom prst="rect">
             <a:avLst/>
@@ -5437,7 +5481,7 @@
       </p:pic>
       <p:pic>
         <p:nvPicPr>
-          <p:cNvPr id="11" name="Picture 10"/>
+          <p:cNvPr id="4" name="Picture 3"/>
           <p:cNvPicPr>
             <a:picLocks noChangeAspect="1"/>
           </p:cNvPicPr>
@@ -5457,8 +5501,8 @@
         </p:blipFill>
         <p:spPr>
           <a:xfrm>
-            <a:off x="519221" y="3683808"/>
-            <a:ext cx="3563389" cy="2672542"/>
+            <a:off x="363192" y="1283082"/>
+            <a:ext cx="3399701" cy="2549776"/>
           </a:xfrm>
           <a:prstGeom prst="rect">
             <a:avLst/>
@@ -5467,7 +5511,7 @@
       </p:pic>
       <p:pic>
         <p:nvPicPr>
-          <p:cNvPr id="12" name="Picture 11"/>
+          <p:cNvPr id="8" name="Picture 7"/>
           <p:cNvPicPr>
             <a:picLocks noChangeAspect="1"/>
           </p:cNvPicPr>
@@ -5487,8 +5531,8 @@
         </p:blipFill>
         <p:spPr>
           <a:xfrm>
-            <a:off x="4112028" y="3683808"/>
-            <a:ext cx="3664852" cy="2748639"/>
+            <a:off x="3762893" y="1283082"/>
+            <a:ext cx="3399701" cy="2549776"/>
           </a:xfrm>
           <a:prstGeom prst="rect">
             <a:avLst/>
@@ -5497,28 +5541,22 @@
       </p:pic>
       <p:pic>
         <p:nvPicPr>
-          <p:cNvPr id="15" name="Picture 14"/>
+          <p:cNvPr id="10" name="Picture 9"/>
           <p:cNvPicPr>
             <a:picLocks noChangeAspect="1"/>
           </p:cNvPicPr>
           <p:nvPr/>
         </p:nvPicPr>
         <p:blipFill>
-          <a:blip r:embed="rId7">
-            <a:extLst>
-              <a:ext uri="{28A0092B-C50C-407E-A947-70E740481C1C}">
-                <a14:useLocalDpi xmlns:a14="http://schemas.microsoft.com/office/drawing/2010/main" val="0"/>
-              </a:ext>
-            </a:extLst>
-          </a:blip>
+          <a:blip r:embed="rId7"/>
           <a:stretch>
             <a:fillRect/>
           </a:stretch>
         </p:blipFill>
         <p:spPr>
           <a:xfrm>
-            <a:off x="7806298" y="3683808"/>
-            <a:ext cx="3577244" cy="2682933"/>
+            <a:off x="7443931" y="3943581"/>
+            <a:ext cx="3247620" cy="2435715"/>
           </a:xfrm>
           <a:prstGeom prst="rect">
             <a:avLst/>
@@ -5528,7 +5566,7 @@
     </p:spTree>
     <p:extLst>
       <p:ext uri="{BB962C8B-B14F-4D97-AF65-F5344CB8AC3E}">
-        <p14:creationId xmlns:p14="http://schemas.microsoft.com/office/powerpoint/2010/main" val="4043573800"/>
+        <p14:creationId xmlns:p14="http://schemas.microsoft.com/office/powerpoint/2010/main" val="4268639796"/>
       </p:ext>
     </p:extLst>
   </p:cSld>
@@ -5587,7 +5625,7 @@
         </p:nvSpPr>
         <p:spPr>
           <a:xfrm>
-            <a:off x="527534" y="247435"/>
+            <a:off x="519221" y="205871"/>
             <a:ext cx="10046255" cy="584775"/>
           </a:xfrm>
           <a:prstGeom prst="rect">
@@ -5602,89 +5640,181 @@
           <a:lstStyle/>
           <a:p>
             <a:r>
-              <a:rPr lang="en-US" sz="3200" dirty="0" smtClean="0"/>
-              <a:t>Conclusion</a:t>
-            </a:r>
-            <a:endParaRPr lang="en-US" sz="3200" dirty="0"/>
-          </a:p>
-        </p:txBody>
-      </p:sp>
-      <p:sp>
-        <p:nvSpPr>
-          <p:cNvPr id="2" name="TextBox 1"/>
-          <p:cNvSpPr txBox="1"/>
+              <a:rPr lang="en-US" sz="3200" dirty="0"/>
+              <a:t>Test Result: </a:t>
+            </a:r>
+            <a:r>
+              <a:rPr lang="en-US" sz="2800" dirty="0"/>
+              <a:t>Constrained </a:t>
+            </a:r>
+            <a:r>
+              <a:rPr lang="en-US" sz="2800" dirty="0" smtClean="0"/>
+              <a:t>Source </a:t>
+            </a:r>
+            <a:r>
+              <a:rPr lang="en-US" sz="2800" dirty="0"/>
+              <a:t>and Unconstrained </a:t>
+            </a:r>
+            <a:r>
+              <a:rPr lang="en-US" sz="2800" dirty="0" smtClean="0"/>
+              <a:t>Link </a:t>
+            </a:r>
+            <a:r>
+              <a:rPr lang="en-US" sz="2800" dirty="0"/>
+              <a:t>Test</a:t>
+            </a:r>
+            <a:r>
+              <a:rPr lang="en-US" sz="3200" dirty="0"/>
+              <a:t> </a:t>
+            </a:r>
+          </a:p>
+        </p:txBody>
+      </p:sp>
+      <p:sp>
+        <p:nvSpPr>
+          <p:cNvPr id="7" name="Rectangle 6"/>
+          <p:cNvSpPr/>
           <p:nvPr/>
         </p:nvSpPr>
         <p:spPr>
           <a:xfrm>
-            <a:off x="492743" y="1378288"/>
-            <a:ext cx="9489457" cy="1477328"/>
-          </a:xfrm>
-          <a:prstGeom prst="rect">
-            <a:avLst/>
-          </a:prstGeom>
-          <a:noFill/>
-        </p:spPr>
-        <p:txBody>
-          <a:bodyPr wrap="none" rtlCol="0">
+            <a:off x="951482" y="3412738"/>
+            <a:ext cx="1092671" cy="369332"/>
+          </a:xfrm>
+          <a:prstGeom prst="rect">
+            <a:avLst/>
+          </a:prstGeom>
+        </p:spPr>
+        <p:txBody>
+          <a:bodyPr wrap="none">
             <a:spAutoFit/>
           </a:bodyPr>
           <a:lstStyle/>
           <a:p>
-            <a:pPr marL="342900" indent="-342900">
-              <a:buAutoNum type="arabicPeriod"/>
-            </a:pPr>
+            <a:r>
+              <a:rPr lang="en-US" dirty="0"/>
+              <a:t>2</a:t>
+            </a:r>
             <a:r>
               <a:rPr lang="en-US" dirty="0" smtClean="0"/>
-              <a:t>For all three test conditions, the majority of the results of step run match the bulk run perfectly.</a:t>
-            </a:r>
-          </a:p>
-          <a:p>
-            <a:pPr marL="342900" indent="-342900">
-              <a:buAutoNum type="arabicPeriod"/>
-            </a:pPr>
-            <a:r>
-              <a:rPr lang="en-US" dirty="0" smtClean="0"/>
-              <a:t>There may be two reasons that a few results are not matched:</a:t>
+              <a:t>.    LEAP:</a:t>
             </a:r>
             <a:endParaRPr lang="en-US" dirty="0"/>
           </a:p>
-          <a:p>
-            <a:pPr marL="800100" lvl="1" indent="-342900">
-              <a:buFont typeface="Arial" panose="020B0604020202020204" pitchFamily="34" charset="0"/>
-              <a:buChar char="•"/>
-            </a:pPr>
-            <a:r>
-              <a:rPr lang="en-US" dirty="0" smtClean="0"/>
-              <a:t>The roundup error when WEAP and LEAP process data</a:t>
-            </a:r>
-          </a:p>
-          <a:p>
-            <a:pPr marL="800100" lvl="1" indent="-342900">
-              <a:buFont typeface="Arial" panose="020B0604020202020204" pitchFamily="34" charset="0"/>
-              <a:buChar char="•"/>
-            </a:pPr>
-            <a:r>
-              <a:rPr lang="en-US" dirty="0" smtClean="0"/>
-              <a:t>Incorrectly updating the input parameter at each time step</a:t>
-            </a:r>
-          </a:p>
-          <a:p>
-            <a:pPr marL="342900" indent="-342900">
-              <a:buAutoNum type="arabicPeriod"/>
-            </a:pPr>
-            <a:r>
-              <a:rPr lang="en-US" dirty="0" smtClean="0"/>
-              <a:t>Controlling WEAP and LEAP to run by yearly steps is possible!</a:t>
-            </a:r>
-            <a:endParaRPr lang="en-US" dirty="0"/>
-          </a:p>
-        </p:txBody>
-      </p:sp>
+        </p:txBody>
+      </p:sp>
+      <p:pic>
+        <p:nvPicPr>
+          <p:cNvPr id="2" name="Picture 1"/>
+          <p:cNvPicPr>
+            <a:picLocks noChangeAspect="1"/>
+          </p:cNvPicPr>
+          <p:nvPr/>
+        </p:nvPicPr>
+        <p:blipFill>
+          <a:blip r:embed="rId2">
+            <a:extLst>
+              <a:ext uri="{28A0092B-C50C-407E-A947-70E740481C1C}">
+                <a14:useLocalDpi xmlns:a14="http://schemas.microsoft.com/office/drawing/2010/main" val="0"/>
+              </a:ext>
+            </a:extLst>
+          </a:blip>
+          <a:stretch>
+            <a:fillRect/>
+          </a:stretch>
+        </p:blipFill>
+        <p:spPr>
+          <a:xfrm>
+            <a:off x="590445" y="866121"/>
+            <a:ext cx="3045872" cy="2284404"/>
+          </a:xfrm>
+          <a:prstGeom prst="rect">
+            <a:avLst/>
+          </a:prstGeom>
+        </p:spPr>
+      </p:pic>
+      <p:pic>
+        <p:nvPicPr>
+          <p:cNvPr id="4" name="Picture 3"/>
+          <p:cNvPicPr>
+            <a:picLocks noChangeAspect="1"/>
+          </p:cNvPicPr>
+          <p:nvPr/>
+        </p:nvPicPr>
+        <p:blipFill>
+          <a:blip r:embed="rId3">
+            <a:extLst>
+              <a:ext uri="{28A0092B-C50C-407E-A947-70E740481C1C}">
+                <a14:useLocalDpi xmlns:a14="http://schemas.microsoft.com/office/drawing/2010/main" val="0"/>
+              </a:ext>
+            </a:extLst>
+          </a:blip>
+          <a:stretch>
+            <a:fillRect/>
+          </a:stretch>
+        </p:blipFill>
+        <p:spPr>
+          <a:xfrm>
+            <a:off x="379621" y="3949468"/>
+            <a:ext cx="3352414" cy="2514311"/>
+          </a:xfrm>
+          <a:prstGeom prst="rect">
+            <a:avLst/>
+          </a:prstGeom>
+        </p:spPr>
+      </p:pic>
+      <p:pic>
+        <p:nvPicPr>
+          <p:cNvPr id="3" name="Picture 2"/>
+          <p:cNvPicPr>
+            <a:picLocks noChangeAspect="1"/>
+          </p:cNvPicPr>
+          <p:nvPr/>
+        </p:nvPicPr>
+        <p:blipFill>
+          <a:blip r:embed="rId4"/>
+          <a:stretch>
+            <a:fillRect/>
+          </a:stretch>
+        </p:blipFill>
+        <p:spPr>
+          <a:xfrm>
+            <a:off x="3883336" y="3949468"/>
+            <a:ext cx="3418202" cy="2563652"/>
+          </a:xfrm>
+          <a:prstGeom prst="rect">
+            <a:avLst/>
+          </a:prstGeom>
+        </p:spPr>
+      </p:pic>
+      <p:pic>
+        <p:nvPicPr>
+          <p:cNvPr id="9" name="Picture 8"/>
+          <p:cNvPicPr>
+            <a:picLocks noChangeAspect="1"/>
+          </p:cNvPicPr>
+          <p:nvPr/>
+        </p:nvPicPr>
+        <p:blipFill>
+          <a:blip r:embed="rId5"/>
+          <a:stretch>
+            <a:fillRect/>
+          </a:stretch>
+        </p:blipFill>
+        <p:spPr>
+          <a:xfrm>
+            <a:off x="7887774" y="3949468"/>
+            <a:ext cx="3466026" cy="2599520"/>
+          </a:xfrm>
+          <a:prstGeom prst="rect">
+            <a:avLst/>
+          </a:prstGeom>
+        </p:spPr>
+      </p:pic>
     </p:spTree>
     <p:extLst>
       <p:ext uri="{BB962C8B-B14F-4D97-AF65-F5344CB8AC3E}">
-        <p14:creationId xmlns:p14="http://schemas.microsoft.com/office/powerpoint/2010/main" val="907931829"/>
+        <p14:creationId xmlns:p14="http://schemas.microsoft.com/office/powerpoint/2010/main" val="2860425268"/>
       </p:ext>
     </p:extLst>
   </p:cSld>
@@ -5730,6 +5860,443 @@
               <a:rPr lang="en-US" smtClean="0"/>
               <a:pPr/>
               <a:t>15</a:t>
+            </a:fld>
+            <a:endParaRPr lang="en-US" dirty="0"/>
+          </a:p>
+        </p:txBody>
+      </p:sp>
+      <p:sp>
+        <p:nvSpPr>
+          <p:cNvPr id="6" name="TextBox 5"/>
+          <p:cNvSpPr txBox="1"/>
+          <p:nvPr/>
+        </p:nvSpPr>
+        <p:spPr>
+          <a:xfrm>
+            <a:off x="519221" y="205871"/>
+            <a:ext cx="10046255" cy="584775"/>
+          </a:xfrm>
+          <a:prstGeom prst="rect">
+            <a:avLst/>
+          </a:prstGeom>
+          <a:noFill/>
+        </p:spPr>
+        <p:txBody>
+          <a:bodyPr wrap="square" rtlCol="0">
+            <a:spAutoFit/>
+          </a:bodyPr>
+          <a:lstStyle/>
+          <a:p>
+            <a:r>
+              <a:rPr lang="en-US" sz="3200" dirty="0"/>
+              <a:t>Test Result: </a:t>
+            </a:r>
+            <a:r>
+              <a:rPr lang="en-US" sz="2800" dirty="0"/>
+              <a:t>Constrained </a:t>
+            </a:r>
+            <a:r>
+              <a:rPr lang="en-US" sz="2800" dirty="0" smtClean="0"/>
+              <a:t>Source </a:t>
+            </a:r>
+            <a:r>
+              <a:rPr lang="en-US" sz="2800" dirty="0"/>
+              <a:t>and Unconstrained </a:t>
+            </a:r>
+            <a:r>
+              <a:rPr lang="en-US" sz="2800" dirty="0" smtClean="0"/>
+              <a:t>Link </a:t>
+            </a:r>
+            <a:r>
+              <a:rPr lang="en-US" sz="2800" dirty="0"/>
+              <a:t>Test</a:t>
+            </a:r>
+            <a:r>
+              <a:rPr lang="en-US" sz="3200" dirty="0"/>
+              <a:t> </a:t>
+            </a:r>
+          </a:p>
+        </p:txBody>
+      </p:sp>
+      <p:pic>
+        <p:nvPicPr>
+          <p:cNvPr id="7" name="Picture 6"/>
+          <p:cNvPicPr>
+            <a:picLocks noChangeAspect="1"/>
+          </p:cNvPicPr>
+          <p:nvPr/>
+        </p:nvPicPr>
+        <p:blipFill>
+          <a:blip r:embed="rId2">
+            <a:extLst>
+              <a:ext uri="{28A0092B-C50C-407E-A947-70E740481C1C}">
+                <a14:useLocalDpi xmlns:a14="http://schemas.microsoft.com/office/drawing/2010/main" val="0"/>
+              </a:ext>
+            </a:extLst>
+          </a:blip>
+          <a:stretch>
+            <a:fillRect/>
+          </a:stretch>
+        </p:blipFill>
+        <p:spPr>
+          <a:xfrm>
+            <a:off x="4263777" y="873144"/>
+            <a:ext cx="3513103" cy="2634827"/>
+          </a:xfrm>
+          <a:prstGeom prst="rect">
+            <a:avLst/>
+          </a:prstGeom>
+        </p:spPr>
+      </p:pic>
+      <p:pic>
+        <p:nvPicPr>
+          <p:cNvPr id="10" name="Picture 9"/>
+          <p:cNvPicPr>
+            <a:picLocks noChangeAspect="1"/>
+          </p:cNvPicPr>
+          <p:nvPr/>
+        </p:nvPicPr>
+        <p:blipFill>
+          <a:blip r:embed="rId3">
+            <a:extLst>
+              <a:ext uri="{28A0092B-C50C-407E-A947-70E740481C1C}">
+                <a14:useLocalDpi xmlns:a14="http://schemas.microsoft.com/office/drawing/2010/main" val="0"/>
+              </a:ext>
+            </a:extLst>
+          </a:blip>
+          <a:stretch>
+            <a:fillRect/>
+          </a:stretch>
+        </p:blipFill>
+        <p:spPr>
+          <a:xfrm>
+            <a:off x="8008334" y="873145"/>
+            <a:ext cx="3513106" cy="2634830"/>
+          </a:xfrm>
+          <a:prstGeom prst="rect">
+            <a:avLst/>
+          </a:prstGeom>
+        </p:spPr>
+      </p:pic>
+      <p:pic>
+        <p:nvPicPr>
+          <p:cNvPr id="11" name="Picture 10"/>
+          <p:cNvPicPr>
+            <a:picLocks noChangeAspect="1"/>
+          </p:cNvPicPr>
+          <p:nvPr/>
+        </p:nvPicPr>
+        <p:blipFill>
+          <a:blip r:embed="rId4">
+            <a:extLst>
+              <a:ext uri="{28A0092B-C50C-407E-A947-70E740481C1C}">
+                <a14:useLocalDpi xmlns:a14="http://schemas.microsoft.com/office/drawing/2010/main" val="0"/>
+              </a:ext>
+            </a:extLst>
+          </a:blip>
+          <a:stretch>
+            <a:fillRect/>
+          </a:stretch>
+        </p:blipFill>
+        <p:spPr>
+          <a:xfrm>
+            <a:off x="519221" y="3683808"/>
+            <a:ext cx="3563389" cy="2672542"/>
+          </a:xfrm>
+          <a:prstGeom prst="rect">
+            <a:avLst/>
+          </a:prstGeom>
+        </p:spPr>
+      </p:pic>
+      <p:pic>
+        <p:nvPicPr>
+          <p:cNvPr id="12" name="Picture 11"/>
+          <p:cNvPicPr>
+            <a:picLocks noChangeAspect="1"/>
+          </p:cNvPicPr>
+          <p:nvPr/>
+        </p:nvPicPr>
+        <p:blipFill>
+          <a:blip r:embed="rId5">
+            <a:extLst>
+              <a:ext uri="{28A0092B-C50C-407E-A947-70E740481C1C}">
+                <a14:useLocalDpi xmlns:a14="http://schemas.microsoft.com/office/drawing/2010/main" val="0"/>
+              </a:ext>
+            </a:extLst>
+          </a:blip>
+          <a:stretch>
+            <a:fillRect/>
+          </a:stretch>
+        </p:blipFill>
+        <p:spPr>
+          <a:xfrm>
+            <a:off x="4112028" y="3683808"/>
+            <a:ext cx="3664852" cy="2748639"/>
+          </a:xfrm>
+          <a:prstGeom prst="rect">
+            <a:avLst/>
+          </a:prstGeom>
+        </p:spPr>
+      </p:pic>
+      <p:pic>
+        <p:nvPicPr>
+          <p:cNvPr id="15" name="Picture 14"/>
+          <p:cNvPicPr>
+            <a:picLocks noChangeAspect="1"/>
+          </p:cNvPicPr>
+          <p:nvPr/>
+        </p:nvPicPr>
+        <p:blipFill>
+          <a:blip r:embed="rId6">
+            <a:extLst>
+              <a:ext uri="{28A0092B-C50C-407E-A947-70E740481C1C}">
+                <a14:useLocalDpi xmlns:a14="http://schemas.microsoft.com/office/drawing/2010/main" val="0"/>
+              </a:ext>
+            </a:extLst>
+          </a:blip>
+          <a:stretch>
+            <a:fillRect/>
+          </a:stretch>
+        </p:blipFill>
+        <p:spPr>
+          <a:xfrm>
+            <a:off x="7806298" y="3683808"/>
+            <a:ext cx="3577244" cy="2682933"/>
+          </a:xfrm>
+          <a:prstGeom prst="rect">
+            <a:avLst/>
+          </a:prstGeom>
+        </p:spPr>
+      </p:pic>
+      <p:pic>
+        <p:nvPicPr>
+          <p:cNvPr id="2" name="Picture 1"/>
+          <p:cNvPicPr>
+            <a:picLocks noChangeAspect="1"/>
+          </p:cNvPicPr>
+          <p:nvPr/>
+        </p:nvPicPr>
+        <p:blipFill>
+          <a:blip r:embed="rId7"/>
+          <a:stretch>
+            <a:fillRect/>
+          </a:stretch>
+        </p:blipFill>
+        <p:spPr>
+          <a:xfrm>
+            <a:off x="574125" y="873144"/>
+            <a:ext cx="3453579" cy="2590185"/>
+          </a:xfrm>
+          <a:prstGeom prst="rect">
+            <a:avLst/>
+          </a:prstGeom>
+        </p:spPr>
+      </p:pic>
+    </p:spTree>
+    <p:extLst>
+      <p:ext uri="{BB962C8B-B14F-4D97-AF65-F5344CB8AC3E}">
+        <p14:creationId xmlns:p14="http://schemas.microsoft.com/office/powerpoint/2010/main" val="4043573800"/>
+      </p:ext>
+    </p:extLst>
+  </p:cSld>
+  <p:clrMapOvr>
+    <a:masterClrMapping/>
+  </p:clrMapOvr>
+</p:sld>
+</file>
+
+<file path=ppt/slides/slide16.xml><?xml version="1.0" encoding="utf-8"?>
+<p:sld xmlns:a="http://schemas.openxmlformats.org/drawingml/2006/main" xmlns:r="http://schemas.openxmlformats.org/officeDocument/2006/relationships" xmlns:p="http://schemas.openxmlformats.org/presentationml/2006/main">
+  <p:cSld>
+    <p:spTree>
+      <p:nvGrpSpPr>
+        <p:cNvPr id="1" name=""/>
+        <p:cNvGrpSpPr/>
+        <p:nvPr/>
+      </p:nvGrpSpPr>
+      <p:grpSpPr>
+        <a:xfrm>
+          <a:off x="0" y="0"/>
+          <a:ext cx="0" cy="0"/>
+          <a:chOff x="0" y="0"/>
+          <a:chExt cx="0" cy="0"/>
+        </a:xfrm>
+      </p:grpSpPr>
+      <p:sp>
+        <p:nvSpPr>
+          <p:cNvPr id="5" name="Slide Number Placeholder 4"/>
+          <p:cNvSpPr>
+            <a:spLocks noGrp="1"/>
+          </p:cNvSpPr>
+          <p:nvPr>
+            <p:ph type="sldNum" sz="quarter" idx="12"/>
+          </p:nvPr>
+        </p:nvSpPr>
+        <p:spPr/>
+        <p:txBody>
+          <a:bodyPr/>
+          <a:lstStyle/>
+          <a:p>
+            <a:fld id="{90F3C78D-3DB8-C64C-BA66-FD220ADFD702}" type="slidenum">
+              <a:rPr lang="en-US" smtClean="0"/>
+              <a:pPr/>
+              <a:t>16</a:t>
+            </a:fld>
+            <a:endParaRPr lang="en-US" dirty="0"/>
+          </a:p>
+        </p:txBody>
+      </p:sp>
+      <p:sp>
+        <p:nvSpPr>
+          <p:cNvPr id="6" name="TextBox 5"/>
+          <p:cNvSpPr txBox="1"/>
+          <p:nvPr/>
+        </p:nvSpPr>
+        <p:spPr>
+          <a:xfrm>
+            <a:off x="527534" y="247435"/>
+            <a:ext cx="10046255" cy="584775"/>
+          </a:xfrm>
+          <a:prstGeom prst="rect">
+            <a:avLst/>
+          </a:prstGeom>
+          <a:noFill/>
+        </p:spPr>
+        <p:txBody>
+          <a:bodyPr wrap="square" rtlCol="0">
+            <a:spAutoFit/>
+          </a:bodyPr>
+          <a:lstStyle/>
+          <a:p>
+            <a:r>
+              <a:rPr lang="en-US" sz="3200" dirty="0" smtClean="0"/>
+              <a:t>Conclusion</a:t>
+            </a:r>
+            <a:endParaRPr lang="en-US" sz="3200" dirty="0"/>
+          </a:p>
+        </p:txBody>
+      </p:sp>
+      <p:sp>
+        <p:nvSpPr>
+          <p:cNvPr id="2" name="TextBox 1"/>
+          <p:cNvSpPr txBox="1"/>
+          <p:nvPr/>
+        </p:nvSpPr>
+        <p:spPr>
+          <a:xfrm>
+            <a:off x="492743" y="1378288"/>
+            <a:ext cx="9489457" cy="1477328"/>
+          </a:xfrm>
+          <a:prstGeom prst="rect">
+            <a:avLst/>
+          </a:prstGeom>
+          <a:noFill/>
+        </p:spPr>
+        <p:txBody>
+          <a:bodyPr wrap="none" rtlCol="0">
+            <a:spAutoFit/>
+          </a:bodyPr>
+          <a:lstStyle/>
+          <a:p>
+            <a:pPr marL="342900" indent="-342900">
+              <a:buAutoNum type="arabicPeriod"/>
+            </a:pPr>
+            <a:r>
+              <a:rPr lang="en-US" dirty="0" smtClean="0"/>
+              <a:t>For all three test conditions, the majority of the results of step run match the bulk run perfectly.</a:t>
+            </a:r>
+          </a:p>
+          <a:p>
+            <a:pPr marL="342900" indent="-342900">
+              <a:buAutoNum type="arabicPeriod"/>
+            </a:pPr>
+            <a:r>
+              <a:rPr lang="en-US" dirty="0" smtClean="0"/>
+              <a:t>There may be two reasons that a few results are not matched:</a:t>
+            </a:r>
+            <a:endParaRPr lang="en-US" dirty="0"/>
+          </a:p>
+          <a:p>
+            <a:pPr marL="800100" lvl="1" indent="-342900">
+              <a:buFont typeface="Arial" panose="020B0604020202020204" pitchFamily="34" charset="0"/>
+              <a:buChar char="•"/>
+            </a:pPr>
+            <a:r>
+              <a:rPr lang="en-US" dirty="0" smtClean="0"/>
+              <a:t>The roundup error when WEAP and LEAP process data</a:t>
+            </a:r>
+          </a:p>
+          <a:p>
+            <a:pPr marL="800100" lvl="1" indent="-342900">
+              <a:buFont typeface="Arial" panose="020B0604020202020204" pitchFamily="34" charset="0"/>
+              <a:buChar char="•"/>
+            </a:pPr>
+            <a:r>
+              <a:rPr lang="en-US" dirty="0" smtClean="0"/>
+              <a:t>Incorrectly updating the input parameter at each time step</a:t>
+            </a:r>
+          </a:p>
+          <a:p>
+            <a:pPr marL="342900" indent="-342900">
+              <a:buAutoNum type="arabicPeriod"/>
+            </a:pPr>
+            <a:r>
+              <a:rPr lang="en-US" dirty="0" smtClean="0"/>
+              <a:t>Controlling WEAP and LEAP to run by yearly steps is possible!</a:t>
+            </a:r>
+            <a:endParaRPr lang="en-US" dirty="0"/>
+          </a:p>
+        </p:txBody>
+      </p:sp>
+    </p:spTree>
+    <p:extLst>
+      <p:ext uri="{BB962C8B-B14F-4D97-AF65-F5344CB8AC3E}">
+        <p14:creationId xmlns:p14="http://schemas.microsoft.com/office/powerpoint/2010/main" val="907931829"/>
+      </p:ext>
+    </p:extLst>
+  </p:cSld>
+  <p:clrMapOvr>
+    <a:masterClrMapping/>
+  </p:clrMapOvr>
+</p:sld>
+</file>
+
+<file path=ppt/slides/slide17.xml><?xml version="1.0" encoding="utf-8"?>
+<p:sld xmlns:a="http://schemas.openxmlformats.org/drawingml/2006/main" xmlns:r="http://schemas.openxmlformats.org/officeDocument/2006/relationships" xmlns:p="http://schemas.openxmlformats.org/presentationml/2006/main">
+  <p:cSld>
+    <p:spTree>
+      <p:nvGrpSpPr>
+        <p:cNvPr id="1" name=""/>
+        <p:cNvGrpSpPr/>
+        <p:nvPr/>
+      </p:nvGrpSpPr>
+      <p:grpSpPr>
+        <a:xfrm>
+          <a:off x="0" y="0"/>
+          <a:ext cx="0" cy="0"/>
+          <a:chOff x="0" y="0"/>
+          <a:chExt cx="0" cy="0"/>
+        </a:xfrm>
+      </p:grpSpPr>
+      <p:sp>
+        <p:nvSpPr>
+          <p:cNvPr id="5" name="Slide Number Placeholder 4"/>
+          <p:cNvSpPr>
+            <a:spLocks noGrp="1"/>
+          </p:cNvSpPr>
+          <p:nvPr>
+            <p:ph type="sldNum" sz="quarter" idx="12"/>
+          </p:nvPr>
+        </p:nvSpPr>
+        <p:spPr/>
+        <p:txBody>
+          <a:bodyPr/>
+          <a:lstStyle/>
+          <a:p>
+            <a:fld id="{90F3C78D-3DB8-C64C-BA66-FD220ADFD702}" type="slidenum">
+              <a:rPr lang="en-US" smtClean="0"/>
+              <a:pPr/>
+              <a:t>17</a:t>
             </a:fld>
             <a:endParaRPr lang="en-US" dirty="0"/>
           </a:p>
@@ -6058,6 +6625,35 @@
           </a:prstGeom>
         </p:spPr>
       </p:pic>
+      <p:sp>
+        <p:nvSpPr>
+          <p:cNvPr id="5" name="Slide Number Placeholder 4"/>
+          <p:cNvSpPr>
+            <a:spLocks noGrp="1"/>
+          </p:cNvSpPr>
+          <p:nvPr>
+            <p:ph type="sldNum" sz="quarter" idx="12"/>
+          </p:nvPr>
+        </p:nvSpPr>
+        <p:spPr>
+          <a:xfrm>
+            <a:off x="8610600" y="6356350"/>
+            <a:ext cx="2743200" cy="365125"/>
+          </a:xfrm>
+        </p:spPr>
+        <p:txBody>
+          <a:bodyPr/>
+          <a:lstStyle/>
+          <a:p>
+            <a:fld id="{90F3C78D-3DB8-C64C-BA66-FD220ADFD702}" type="slidenum">
+              <a:rPr lang="en-US" smtClean="0"/>
+              <a:pPr/>
+              <a:t>2</a:t>
+            </a:fld>
+            <a:endParaRPr lang="en-US" dirty="0"/>
+          </a:p>
+        </p:txBody>
+      </p:sp>
     </p:spTree>
     <p:extLst>
       <p:ext uri="{BB962C8B-B14F-4D97-AF65-F5344CB8AC3E}">
@@ -6236,6 +6832,35 @@
           </a:prstGeom>
         </p:spPr>
       </p:pic>
+      <p:sp>
+        <p:nvSpPr>
+          <p:cNvPr id="8" name="Slide Number Placeholder 4"/>
+          <p:cNvSpPr>
+            <a:spLocks noGrp="1"/>
+          </p:cNvSpPr>
+          <p:nvPr>
+            <p:ph type="sldNum" sz="quarter" idx="12"/>
+          </p:nvPr>
+        </p:nvSpPr>
+        <p:spPr>
+          <a:xfrm>
+            <a:off x="8610600" y="6356350"/>
+            <a:ext cx="2743200" cy="365125"/>
+          </a:xfrm>
+        </p:spPr>
+        <p:txBody>
+          <a:bodyPr/>
+          <a:lstStyle/>
+          <a:p>
+            <a:fld id="{90F3C78D-3DB8-C64C-BA66-FD220ADFD702}" type="slidenum">
+              <a:rPr lang="en-US" smtClean="0"/>
+              <a:pPr/>
+              <a:t>3</a:t>
+            </a:fld>
+            <a:endParaRPr lang="en-US" dirty="0"/>
+          </a:p>
+        </p:txBody>
+      </p:sp>
     </p:spTree>
     <p:extLst>
       <p:ext uri="{BB962C8B-B14F-4D97-AF65-F5344CB8AC3E}">
@@ -6433,6 +7058,35 @@
           </a:p>
         </p:txBody>
       </p:sp>
+      <p:sp>
+        <p:nvSpPr>
+          <p:cNvPr id="5" name="Slide Number Placeholder 4"/>
+          <p:cNvSpPr>
+            <a:spLocks noGrp="1"/>
+          </p:cNvSpPr>
+          <p:nvPr>
+            <p:ph type="sldNum" sz="quarter" idx="12"/>
+          </p:nvPr>
+        </p:nvSpPr>
+        <p:spPr>
+          <a:xfrm>
+            <a:off x="8610600" y="6356350"/>
+            <a:ext cx="2743200" cy="365125"/>
+          </a:xfrm>
+        </p:spPr>
+        <p:txBody>
+          <a:bodyPr/>
+          <a:lstStyle/>
+          <a:p>
+            <a:fld id="{90F3C78D-3DB8-C64C-BA66-FD220ADFD702}" type="slidenum">
+              <a:rPr lang="en-US" smtClean="0"/>
+              <a:pPr/>
+              <a:t>4</a:t>
+            </a:fld>
+            <a:endParaRPr lang="en-US" dirty="0"/>
+          </a:p>
+        </p:txBody>
+      </p:sp>
     </p:spTree>
     <p:extLst>
       <p:ext uri="{BB962C8B-B14F-4D97-AF65-F5344CB8AC3E}">
@@ -6477,6 +7131,531 @@
       </p:grpSpPr>
       <p:sp>
         <p:nvSpPr>
+          <p:cNvPr id="5" name="Slide Number Placeholder 4"/>
+          <p:cNvSpPr>
+            <a:spLocks noGrp="1"/>
+          </p:cNvSpPr>
+          <p:nvPr>
+            <p:ph type="sldNum" sz="quarter" idx="12"/>
+          </p:nvPr>
+        </p:nvSpPr>
+        <p:spPr/>
+        <p:txBody>
+          <a:bodyPr/>
+          <a:lstStyle/>
+          <a:p>
+            <a:fld id="{90F3C78D-3DB8-C64C-BA66-FD220ADFD702}" type="slidenum">
+              <a:rPr lang="en-US" smtClean="0"/>
+              <a:pPr/>
+              <a:t>5</a:t>
+            </a:fld>
+            <a:endParaRPr lang="en-US" dirty="0"/>
+          </a:p>
+        </p:txBody>
+      </p:sp>
+      <p:sp>
+        <p:nvSpPr>
+          <p:cNvPr id="6" name="TextBox 5"/>
+          <p:cNvSpPr txBox="1"/>
+          <p:nvPr/>
+        </p:nvSpPr>
+        <p:spPr>
+          <a:xfrm>
+            <a:off x="552472" y="230809"/>
+            <a:ext cx="9268692" cy="584775"/>
+          </a:xfrm>
+          <a:prstGeom prst="rect">
+            <a:avLst/>
+          </a:prstGeom>
+          <a:noFill/>
+        </p:spPr>
+        <p:txBody>
+          <a:bodyPr wrap="square" rtlCol="0">
+            <a:spAutoFit/>
+          </a:bodyPr>
+          <a:lstStyle/>
+          <a:p>
+            <a:r>
+              <a:rPr lang="en-US" sz="3200" dirty="0" smtClean="0"/>
+              <a:t>WEAP Model</a:t>
+            </a:r>
+            <a:endParaRPr lang="en-US" sz="2800" dirty="0"/>
+          </a:p>
+        </p:txBody>
+      </p:sp>
+      <p:pic>
+        <p:nvPicPr>
+          <p:cNvPr id="8" name="Picture 7"/>
+          <p:cNvPicPr>
+            <a:picLocks noChangeAspect="1"/>
+          </p:cNvPicPr>
+          <p:nvPr/>
+        </p:nvPicPr>
+        <p:blipFill>
+          <a:blip r:embed="rId2"/>
+          <a:stretch>
+            <a:fillRect/>
+          </a:stretch>
+        </p:blipFill>
+        <p:spPr>
+          <a:xfrm>
+            <a:off x="241069" y="1408141"/>
+            <a:ext cx="6166641" cy="4128135"/>
+          </a:xfrm>
+          <a:prstGeom prst="rect">
+            <a:avLst/>
+          </a:prstGeom>
+        </p:spPr>
+      </p:pic>
+      <p:sp>
+        <p:nvSpPr>
+          <p:cNvPr id="9" name="TextBox 8"/>
+          <p:cNvSpPr txBox="1"/>
+          <p:nvPr/>
+        </p:nvSpPr>
+        <p:spPr>
+          <a:xfrm>
+            <a:off x="5818909" y="1612669"/>
+            <a:ext cx="6084916" cy="2462213"/>
+          </a:xfrm>
+          <a:prstGeom prst="rect">
+            <a:avLst/>
+          </a:prstGeom>
+          <a:noFill/>
+        </p:spPr>
+        <p:txBody>
+          <a:bodyPr wrap="square" rtlCol="0">
+            <a:spAutoFit/>
+          </a:bodyPr>
+          <a:lstStyle/>
+          <a:p>
+            <a:r>
+              <a:rPr lang="en-US" dirty="0" smtClean="0"/>
+              <a:t>Coupled Parameters:</a:t>
+            </a:r>
+          </a:p>
+          <a:p>
+            <a:endParaRPr lang="en-US" dirty="0" smtClean="0"/>
+          </a:p>
+          <a:p>
+            <a:r>
+              <a:rPr lang="en-US" dirty="0" smtClean="0"/>
+              <a:t>Power1 </a:t>
+            </a:r>
+            <a:r>
+              <a:rPr lang="en-US" dirty="0"/>
+              <a:t>= </a:t>
+            </a:r>
+            <a:r>
+              <a:rPr lang="en-US" sz="1600" dirty="0">
+                <a:solidFill>
+                  <a:schemeClr val="accent1"/>
+                </a:solidFill>
+              </a:rPr>
+              <a:t>2.1 * </a:t>
+            </a:r>
+            <a:r>
+              <a:rPr lang="en-US" sz="1600" dirty="0" err="1">
+                <a:solidFill>
+                  <a:schemeClr val="accent1"/>
+                </a:solidFill>
+              </a:rPr>
+              <a:t>LEAPValue</a:t>
+            </a:r>
+            <a:r>
+              <a:rPr lang="en-US" sz="1600" dirty="0">
+                <a:solidFill>
+                  <a:schemeClr val="accent1"/>
+                </a:solidFill>
+              </a:rPr>
+              <a:t>(Transformation\Electricity generation\Processes\Power1:Average Power Dispatched[MW])* 24 * </a:t>
+            </a:r>
+            <a:r>
+              <a:rPr lang="en-US" sz="1600" dirty="0" smtClean="0">
+                <a:solidFill>
+                  <a:schemeClr val="accent1"/>
+                </a:solidFill>
+              </a:rPr>
+              <a:t>Days</a:t>
+            </a:r>
+          </a:p>
+          <a:p>
+            <a:endParaRPr lang="en-US" dirty="0"/>
+          </a:p>
+          <a:p>
+            <a:r>
+              <a:rPr lang="en-US" dirty="0"/>
+              <a:t>Power2 = </a:t>
+            </a:r>
+            <a:r>
+              <a:rPr lang="en-US" sz="1600" dirty="0">
+                <a:solidFill>
+                  <a:schemeClr val="accent1"/>
+                </a:solidFill>
+              </a:rPr>
+              <a:t>2.1 * </a:t>
+            </a:r>
+            <a:r>
+              <a:rPr lang="en-US" sz="1600" dirty="0" err="1">
+                <a:solidFill>
+                  <a:schemeClr val="accent1"/>
+                </a:solidFill>
+              </a:rPr>
+              <a:t>LEAPValue</a:t>
+            </a:r>
+            <a:r>
+              <a:rPr lang="en-US" sz="1600" dirty="0">
+                <a:solidFill>
+                  <a:schemeClr val="accent1"/>
+                </a:solidFill>
+              </a:rPr>
+              <a:t>(Transformation\Electricity generation\Processes\Power2:Average Power Dispatched[MW])* 24 * Days  </a:t>
+            </a:r>
+            <a:endParaRPr lang="en-US" dirty="0">
+              <a:solidFill>
+                <a:schemeClr val="accent1"/>
+              </a:solidFill>
+            </a:endParaRPr>
+          </a:p>
+        </p:txBody>
+      </p:sp>
+    </p:spTree>
+    <p:extLst>
+      <p:ext uri="{BB962C8B-B14F-4D97-AF65-F5344CB8AC3E}">
+        <p14:creationId xmlns:p14="http://schemas.microsoft.com/office/powerpoint/2010/main" val="1033234073"/>
+      </p:ext>
+    </p:extLst>
+  </p:cSld>
+  <p:clrMapOvr>
+    <a:masterClrMapping/>
+  </p:clrMapOvr>
+</p:sld>
+</file>
+
+<file path=ppt/slides/slide6.xml><?xml version="1.0" encoding="utf-8"?>
+<p:sld xmlns:a="http://schemas.openxmlformats.org/drawingml/2006/main" xmlns:r="http://schemas.openxmlformats.org/officeDocument/2006/relationships" xmlns:p="http://schemas.openxmlformats.org/presentationml/2006/main">
+  <p:cSld>
+    <p:spTree>
+      <p:nvGrpSpPr>
+        <p:cNvPr id="1" name=""/>
+        <p:cNvGrpSpPr/>
+        <p:nvPr/>
+      </p:nvGrpSpPr>
+      <p:grpSpPr>
+        <a:xfrm>
+          <a:off x="0" y="0"/>
+          <a:ext cx="0" cy="0"/>
+          <a:chOff x="0" y="0"/>
+          <a:chExt cx="0" cy="0"/>
+        </a:xfrm>
+      </p:grpSpPr>
+      <p:sp>
+        <p:nvSpPr>
+          <p:cNvPr id="5" name="Slide Number Placeholder 4"/>
+          <p:cNvSpPr>
+            <a:spLocks noGrp="1"/>
+          </p:cNvSpPr>
+          <p:nvPr>
+            <p:ph type="sldNum" sz="quarter" idx="12"/>
+          </p:nvPr>
+        </p:nvSpPr>
+        <p:spPr/>
+        <p:txBody>
+          <a:bodyPr/>
+          <a:lstStyle/>
+          <a:p>
+            <a:fld id="{90F3C78D-3DB8-C64C-BA66-FD220ADFD702}" type="slidenum">
+              <a:rPr lang="en-US" smtClean="0"/>
+              <a:pPr/>
+              <a:t>6</a:t>
+            </a:fld>
+            <a:endParaRPr lang="en-US" dirty="0"/>
+          </a:p>
+        </p:txBody>
+      </p:sp>
+      <p:sp>
+        <p:nvSpPr>
+          <p:cNvPr id="6" name="TextBox 5"/>
+          <p:cNvSpPr txBox="1"/>
+          <p:nvPr/>
+        </p:nvSpPr>
+        <p:spPr>
+          <a:xfrm>
+            <a:off x="552472" y="230809"/>
+            <a:ext cx="9268692" cy="584775"/>
+          </a:xfrm>
+          <a:prstGeom prst="rect">
+            <a:avLst/>
+          </a:prstGeom>
+          <a:noFill/>
+        </p:spPr>
+        <p:txBody>
+          <a:bodyPr wrap="square" rtlCol="0">
+            <a:spAutoFit/>
+          </a:bodyPr>
+          <a:lstStyle/>
+          <a:p>
+            <a:r>
+              <a:rPr lang="en-US" sz="3200" dirty="0" smtClean="0"/>
+              <a:t>LEAP Model</a:t>
+            </a:r>
+            <a:endParaRPr lang="en-US" sz="2800" dirty="0"/>
+          </a:p>
+        </p:txBody>
+      </p:sp>
+      <p:sp>
+        <p:nvSpPr>
+          <p:cNvPr id="9" name="TextBox 8"/>
+          <p:cNvSpPr txBox="1"/>
+          <p:nvPr/>
+        </p:nvSpPr>
+        <p:spPr>
+          <a:xfrm>
+            <a:off x="5742572" y="1570030"/>
+            <a:ext cx="6380343" cy="4031873"/>
+          </a:xfrm>
+          <a:prstGeom prst="rect">
+            <a:avLst/>
+          </a:prstGeom>
+          <a:noFill/>
+        </p:spPr>
+        <p:txBody>
+          <a:bodyPr wrap="square" rtlCol="0">
+            <a:spAutoFit/>
+          </a:bodyPr>
+          <a:lstStyle/>
+          <a:p>
+            <a:r>
+              <a:rPr lang="en-US" dirty="0" smtClean="0"/>
+              <a:t>Coupled Parameters:</a:t>
+            </a:r>
+          </a:p>
+          <a:p>
+            <a:endParaRPr lang="en-US" dirty="0" smtClean="0"/>
+          </a:p>
+          <a:p>
+            <a:r>
+              <a:rPr lang="en-US" dirty="0" smtClean="0"/>
+              <a:t>CAP pumping </a:t>
+            </a:r>
+            <a:r>
+              <a:rPr lang="en-US" dirty="0"/>
+              <a:t>= </a:t>
+            </a:r>
+            <a:r>
+              <a:rPr lang="en-US" sz="1600" dirty="0">
+                <a:solidFill>
+                  <a:schemeClr val="accent1"/>
+                </a:solidFill>
+              </a:rPr>
+              <a:t>(</a:t>
+            </a:r>
+            <a:r>
+              <a:rPr lang="en-US" sz="1600" dirty="0" err="1">
+                <a:solidFill>
+                  <a:schemeClr val="accent1"/>
+                </a:solidFill>
+              </a:rPr>
+              <a:t>WEAPValue</a:t>
+            </a:r>
+            <a:r>
+              <a:rPr lang="en-US" sz="1600" dirty="0">
+                <a:solidFill>
+                  <a:schemeClr val="accent1"/>
+                </a:solidFill>
+              </a:rPr>
+              <a:t>(Supply and Resources\Transmission Links\to Power2\from Withdrawal Node 3:Total Node Outflow[m^3])+</a:t>
+            </a:r>
+            <a:r>
+              <a:rPr lang="en-US" sz="1600" dirty="0" err="1">
+                <a:solidFill>
+                  <a:schemeClr val="accent1"/>
+                </a:solidFill>
+              </a:rPr>
+              <a:t>WEAPValue</a:t>
+            </a:r>
+            <a:r>
+              <a:rPr lang="en-US" sz="1600" dirty="0">
+                <a:solidFill>
+                  <a:schemeClr val="accent1"/>
+                </a:solidFill>
+              </a:rPr>
+              <a:t>(Supply and Resources\Transmission Links\to Municipal\from Withdrawal Node 1:Total Node Outflow[m^3]))*1.5</a:t>
+            </a:r>
+            <a:endParaRPr lang="en-US" dirty="0"/>
+          </a:p>
+          <a:p>
+            <a:endParaRPr lang="en-US" dirty="0" smtClean="0"/>
+          </a:p>
+          <a:p>
+            <a:r>
+              <a:rPr lang="en-US" dirty="0" smtClean="0"/>
+              <a:t>WTP </a:t>
+            </a:r>
+            <a:r>
+              <a:rPr lang="en-US" dirty="0"/>
+              <a:t>= </a:t>
+            </a:r>
+            <a:r>
+              <a:rPr lang="en-US" sz="1600" dirty="0">
+                <a:solidFill>
+                  <a:schemeClr val="accent1"/>
+                </a:solidFill>
+              </a:rPr>
+              <a:t>(</a:t>
+            </a:r>
+            <a:r>
+              <a:rPr lang="en-US" sz="1600" dirty="0" err="1">
+                <a:solidFill>
+                  <a:schemeClr val="accent1"/>
+                </a:solidFill>
+              </a:rPr>
+              <a:t>WEAPValue</a:t>
+            </a:r>
+            <a:r>
+              <a:rPr lang="en-US" sz="1600" dirty="0">
+                <a:solidFill>
+                  <a:schemeClr val="accent1"/>
+                </a:solidFill>
+              </a:rPr>
+              <a:t>(Supply and Resources\Transmission Links\to Municipal\from Withdrawal Node 2:Total Node Outflow[m^3])+</a:t>
+            </a:r>
+            <a:r>
+              <a:rPr lang="en-US" sz="1600" dirty="0" err="1">
+                <a:solidFill>
+                  <a:schemeClr val="accent1"/>
+                </a:solidFill>
+              </a:rPr>
+              <a:t>WEAPValue</a:t>
+            </a:r>
+            <a:r>
+              <a:rPr lang="en-US" sz="1600" dirty="0">
+                <a:solidFill>
+                  <a:schemeClr val="accent1"/>
+                </a:solidFill>
+              </a:rPr>
+              <a:t>(Supply and Resources\Transmission Links\to Municipal\from Withdrawal Node 1:Total Node Outflow[m^3]))*</a:t>
+            </a:r>
+            <a:r>
+              <a:rPr lang="en-US" sz="1600" dirty="0" smtClean="0">
+                <a:solidFill>
+                  <a:schemeClr val="accent1"/>
+                </a:solidFill>
+              </a:rPr>
+              <a:t>0.45</a:t>
+            </a:r>
+          </a:p>
+          <a:p>
+            <a:endParaRPr lang="en-US" sz="1600" dirty="0">
+              <a:solidFill>
+                <a:schemeClr val="accent1"/>
+              </a:solidFill>
+            </a:endParaRPr>
+          </a:p>
+          <a:p>
+            <a:r>
+              <a:rPr lang="en-US" dirty="0"/>
+              <a:t>WTP = </a:t>
+            </a:r>
+            <a:r>
+              <a:rPr lang="en-US" dirty="0" err="1">
+                <a:solidFill>
+                  <a:schemeClr val="accent1"/>
+                </a:solidFill>
+              </a:rPr>
+              <a:t>WEAPValue</a:t>
+            </a:r>
+            <a:r>
+              <a:rPr lang="en-US" dirty="0">
+                <a:solidFill>
+                  <a:schemeClr val="accent1"/>
+                </a:solidFill>
+              </a:rPr>
+              <a:t>(Supply and Resources\Return Flows\from WWTP\to WWTP </a:t>
+            </a:r>
+            <a:r>
+              <a:rPr lang="en-US" dirty="0" err="1">
+                <a:solidFill>
+                  <a:schemeClr val="accent1"/>
+                </a:solidFill>
+              </a:rPr>
+              <a:t>Return:Total</a:t>
+            </a:r>
+            <a:r>
+              <a:rPr lang="en-US" dirty="0">
+                <a:solidFill>
+                  <a:schemeClr val="accent1"/>
+                </a:solidFill>
+              </a:rPr>
+              <a:t> Node Outflow[m^3])*0.46</a:t>
+            </a:r>
+            <a:endParaRPr lang="en-US" dirty="0"/>
+          </a:p>
+          <a:p>
+            <a:endParaRPr lang="en-US" dirty="0">
+              <a:solidFill>
+                <a:schemeClr val="accent1"/>
+              </a:solidFill>
+            </a:endParaRPr>
+          </a:p>
+        </p:txBody>
+      </p:sp>
+      <p:pic>
+        <p:nvPicPr>
+          <p:cNvPr id="2" name="Picture 1"/>
+          <p:cNvPicPr>
+            <a:picLocks noChangeAspect="1"/>
+          </p:cNvPicPr>
+          <p:nvPr/>
+        </p:nvPicPr>
+        <p:blipFill>
+          <a:blip r:embed="rId2"/>
+          <a:stretch>
+            <a:fillRect/>
+          </a:stretch>
+        </p:blipFill>
+        <p:spPr>
+          <a:xfrm>
+            <a:off x="102062" y="1596044"/>
+            <a:ext cx="5457630" cy="3835631"/>
+          </a:xfrm>
+          <a:prstGeom prst="rect">
+            <a:avLst/>
+          </a:prstGeom>
+        </p:spPr>
+      </p:pic>
+    </p:spTree>
+    <p:extLst>
+      <p:ext uri="{BB962C8B-B14F-4D97-AF65-F5344CB8AC3E}">
+        <p14:creationId xmlns:p14="http://schemas.microsoft.com/office/powerpoint/2010/main" val="1224650192"/>
+      </p:ext>
+    </p:extLst>
+  </p:cSld>
+  <p:clrMapOvr>
+    <a:masterClrMapping/>
+  </p:clrMapOvr>
+</p:sld>
+</file>
+
+<file path=ppt/slides/slide7.xml><?xml version="1.0" encoding="utf-8"?>
+<p:sld xmlns:a="http://schemas.openxmlformats.org/drawingml/2006/main" xmlns:r="http://schemas.openxmlformats.org/officeDocument/2006/relationships" xmlns:p="http://schemas.openxmlformats.org/presentationml/2006/main">
+  <p:cSld>
+    <p:spTree>
+      <p:nvGrpSpPr>
+        <p:cNvPr id="1" name=""/>
+        <p:cNvGrpSpPr/>
+        <p:nvPr/>
+      </p:nvGrpSpPr>
+      <p:grpSpPr>
+        <a:xfrm>
+          <a:off x="0" y="0"/>
+          <a:ext cx="0" cy="0"/>
+          <a:chOff x="0" y="0"/>
+          <a:chExt cx="0" cy="0"/>
+        </a:xfrm>
+      </p:grpSpPr>
+      <p:sp>
+        <p:nvSpPr>
           <p:cNvPr id="7" name="TextBox 6"/>
           <p:cNvSpPr txBox="1"/>
           <p:nvPr/>
@@ -6502,7 +7681,7 @@
               <a:t>Test Result: </a:t>
             </a:r>
             <a:r>
-              <a:rPr lang="en-US" sz="2800" dirty="0"/>
+              <a:rPr lang="en-US" sz="2800" dirty="0" smtClean="0"/>
               <a:t>Unconstrained </a:t>
             </a:r>
             <a:r>
@@ -6696,7 +7875,7 @@
         </p:blipFill>
         <p:spPr>
           <a:xfrm>
-            <a:off x="7704666" y="3941341"/>
+            <a:off x="7865534" y="3944353"/>
             <a:ext cx="3621299" cy="2715974"/>
           </a:xfrm>
           <a:prstGeom prst="rect">
@@ -6732,6 +7911,35 @@
               <a:rPr lang="en-US" dirty="0" smtClean="0"/>
               <a:t>WEAP</a:t>
             </a:r>
+            <a:endParaRPr lang="en-US" dirty="0"/>
+          </a:p>
+        </p:txBody>
+      </p:sp>
+      <p:sp>
+        <p:nvSpPr>
+          <p:cNvPr id="12" name="Slide Number Placeholder 4"/>
+          <p:cNvSpPr>
+            <a:spLocks noGrp="1"/>
+          </p:cNvSpPr>
+          <p:nvPr>
+            <p:ph type="sldNum" sz="quarter" idx="12"/>
+          </p:nvPr>
+        </p:nvSpPr>
+        <p:spPr>
+          <a:xfrm>
+            <a:off x="8992986" y="6361317"/>
+            <a:ext cx="2743200" cy="365125"/>
+          </a:xfrm>
+        </p:spPr>
+        <p:txBody>
+          <a:bodyPr/>
+          <a:lstStyle/>
+          <a:p>
+            <a:fld id="{90F3C78D-3DB8-C64C-BA66-FD220ADFD702}" type="slidenum">
+              <a:rPr lang="en-US" smtClean="0"/>
+              <a:pPr/>
+              <a:t>7</a:t>
+            </a:fld>
             <a:endParaRPr lang="en-US" dirty="0"/>
           </a:p>
         </p:txBody>
@@ -6761,7 +7969,7 @@
 </p:sld>
 </file>
 
-<file path=ppt/slides/slide6.xml><?xml version="1.0" encoding="utf-8"?>
+<file path=ppt/slides/slide8.xml><?xml version="1.0" encoding="utf-8"?>
 <p:sld xmlns:a="http://schemas.openxmlformats.org/drawingml/2006/main" xmlns:r="http://schemas.openxmlformats.org/officeDocument/2006/relationships" xmlns:p="http://schemas.openxmlformats.org/presentationml/2006/main">
   <p:cSld>
     <p:spTree>
@@ -6977,6 +8185,35 @@
           </a:prstGeom>
         </p:spPr>
       </p:pic>
+      <p:sp>
+        <p:nvSpPr>
+          <p:cNvPr id="8" name="Slide Number Placeholder 4"/>
+          <p:cNvSpPr>
+            <a:spLocks noGrp="1"/>
+          </p:cNvSpPr>
+          <p:nvPr>
+            <p:ph type="sldNum" sz="quarter" idx="12"/>
+          </p:nvPr>
+        </p:nvSpPr>
+        <p:spPr>
+          <a:xfrm>
+            <a:off x="8751916" y="6350051"/>
+            <a:ext cx="2743200" cy="365125"/>
+          </a:xfrm>
+        </p:spPr>
+        <p:txBody>
+          <a:bodyPr/>
+          <a:lstStyle/>
+          <a:p>
+            <a:fld id="{90F3C78D-3DB8-C64C-BA66-FD220ADFD702}" type="slidenum">
+              <a:rPr lang="en-US" smtClean="0"/>
+              <a:pPr/>
+              <a:t>8</a:t>
+            </a:fld>
+            <a:endParaRPr lang="en-US" dirty="0"/>
+          </a:p>
+        </p:txBody>
+      </p:sp>
     </p:spTree>
     <p:extLst>
       <p:ext uri="{BB962C8B-B14F-4D97-AF65-F5344CB8AC3E}">
@@ -7009,7 +8246,7 @@
 </p:sld>
 </file>
 
-<file path=ppt/slides/slide7.xml><?xml version="1.0" encoding="utf-8"?>
+<file path=ppt/slides/slide9.xml><?xml version="1.0" encoding="utf-8"?>
 <p:sld xmlns:a="http://schemas.openxmlformats.org/drawingml/2006/main" xmlns:r="http://schemas.openxmlformats.org/officeDocument/2006/relationships" xmlns:p="http://schemas.openxmlformats.org/presentationml/2006/main">
   <p:cSld>
     <p:spTree>
@@ -7256,6 +8493,35 @@
           </a:prstGeom>
         </p:spPr>
       </p:pic>
+      <p:sp>
+        <p:nvSpPr>
+          <p:cNvPr id="16" name="Slide Number Placeholder 4"/>
+          <p:cNvSpPr>
+            <a:spLocks noGrp="1"/>
+          </p:cNvSpPr>
+          <p:nvPr>
+            <p:ph type="sldNum" sz="quarter" idx="12"/>
+          </p:nvPr>
+        </p:nvSpPr>
+        <p:spPr>
+          <a:xfrm>
+            <a:off x="8610600" y="6356350"/>
+            <a:ext cx="2743200" cy="365125"/>
+          </a:xfrm>
+        </p:spPr>
+        <p:txBody>
+          <a:bodyPr/>
+          <a:lstStyle/>
+          <a:p>
+            <a:fld id="{90F3C78D-3DB8-C64C-BA66-FD220ADFD702}" type="slidenum">
+              <a:rPr lang="en-US" smtClean="0"/>
+              <a:pPr/>
+              <a:t>9</a:t>
+            </a:fld>
+            <a:endParaRPr lang="en-US" dirty="0"/>
+          </a:p>
+        </p:txBody>
+      </p:sp>
     </p:spTree>
     <p:extLst>
       <p:ext uri="{BB962C8B-B14F-4D97-AF65-F5344CB8AC3E}">
@@ -7285,572 +8551,6 @@
       </p:par>
     </p:tnLst>
   </p:timing>
-</p:sld>
-</file>
-
-<file path=ppt/slides/slide8.xml><?xml version="1.0" encoding="utf-8"?>
-<p:sld xmlns:a="http://schemas.openxmlformats.org/drawingml/2006/main" xmlns:r="http://schemas.openxmlformats.org/officeDocument/2006/relationships" xmlns:p="http://schemas.openxmlformats.org/presentationml/2006/main">
-  <p:cSld>
-    <p:spTree>
-      <p:nvGrpSpPr>
-        <p:cNvPr id="1" name=""/>
-        <p:cNvGrpSpPr/>
-        <p:nvPr/>
-      </p:nvGrpSpPr>
-      <p:grpSpPr>
-        <a:xfrm>
-          <a:off x="0" y="0"/>
-          <a:ext cx="0" cy="0"/>
-          <a:chOff x="0" y="0"/>
-          <a:chExt cx="0" cy="0"/>
-        </a:xfrm>
-      </p:grpSpPr>
-      <p:sp>
-        <p:nvSpPr>
-          <p:cNvPr id="5" name="Slide Number Placeholder 4"/>
-          <p:cNvSpPr>
-            <a:spLocks noGrp="1"/>
-          </p:cNvSpPr>
-          <p:nvPr>
-            <p:ph type="sldNum" sz="quarter" idx="12"/>
-          </p:nvPr>
-        </p:nvSpPr>
-        <p:spPr/>
-        <p:txBody>
-          <a:bodyPr/>
-          <a:lstStyle/>
-          <a:p>
-            <a:fld id="{90F3C78D-3DB8-C64C-BA66-FD220ADFD702}" type="slidenum">
-              <a:rPr lang="en-US" smtClean="0"/>
-              <a:pPr/>
-              <a:t>8</a:t>
-            </a:fld>
-            <a:endParaRPr lang="en-US" dirty="0"/>
-          </a:p>
-        </p:txBody>
-      </p:sp>
-      <p:sp>
-        <p:nvSpPr>
-          <p:cNvPr id="6" name="TextBox 5"/>
-          <p:cNvSpPr txBox="1"/>
-          <p:nvPr/>
-        </p:nvSpPr>
-        <p:spPr>
-          <a:xfrm>
-            <a:off x="519221" y="205871"/>
-            <a:ext cx="10046255" cy="584775"/>
-          </a:xfrm>
-          <a:prstGeom prst="rect">
-            <a:avLst/>
-          </a:prstGeom>
-          <a:noFill/>
-        </p:spPr>
-        <p:txBody>
-          <a:bodyPr wrap="square" rtlCol="0">
-            <a:spAutoFit/>
-          </a:bodyPr>
-          <a:lstStyle/>
-          <a:p>
-            <a:r>
-              <a:rPr lang="en-US" sz="3200" dirty="0"/>
-              <a:t>Test Result: </a:t>
-            </a:r>
-            <a:r>
-              <a:rPr lang="en-US" sz="2800" dirty="0"/>
-              <a:t>Unconstrained </a:t>
-            </a:r>
-            <a:r>
-              <a:rPr lang="en-US" sz="2800" dirty="0" smtClean="0"/>
-              <a:t>Source </a:t>
-            </a:r>
-            <a:r>
-              <a:rPr lang="en-US" sz="2800" dirty="0"/>
-              <a:t>and </a:t>
-            </a:r>
-            <a:r>
-              <a:rPr lang="en-US" sz="2800" dirty="0" smtClean="0"/>
-              <a:t>Constrained Link Test</a:t>
-            </a:r>
-            <a:endParaRPr lang="en-US" sz="3200" dirty="0"/>
-          </a:p>
-        </p:txBody>
-      </p:sp>
-      <p:sp>
-        <p:nvSpPr>
-          <p:cNvPr id="7" name="Rectangle 6"/>
-          <p:cNvSpPr/>
-          <p:nvPr/>
-        </p:nvSpPr>
-        <p:spPr>
-          <a:xfrm>
-            <a:off x="677163" y="881094"/>
-            <a:ext cx="1200072" cy="369332"/>
-          </a:xfrm>
-          <a:prstGeom prst="rect">
-            <a:avLst/>
-          </a:prstGeom>
-        </p:spPr>
-        <p:txBody>
-          <a:bodyPr wrap="none">
-            <a:spAutoFit/>
-          </a:bodyPr>
-          <a:lstStyle/>
-          <a:p>
-            <a:r>
-              <a:rPr lang="en-US" dirty="0" smtClean="0"/>
-              <a:t>1.    WEAP:</a:t>
-            </a:r>
-            <a:endParaRPr lang="en-US" dirty="0"/>
-          </a:p>
-        </p:txBody>
-      </p:sp>
-      <p:pic>
-        <p:nvPicPr>
-          <p:cNvPr id="2" name="Picture 1"/>
-          <p:cNvPicPr>
-            <a:picLocks noChangeAspect="1"/>
-          </p:cNvPicPr>
-          <p:nvPr/>
-        </p:nvPicPr>
-        <p:blipFill>
-          <a:blip r:embed="rId2">
-            <a:extLst>
-              <a:ext uri="{28A0092B-C50C-407E-A947-70E740481C1C}">
-                <a14:useLocalDpi xmlns:a14="http://schemas.microsoft.com/office/drawing/2010/main" val="0"/>
-              </a:ext>
-            </a:extLst>
-          </a:blip>
-          <a:stretch>
-            <a:fillRect/>
-          </a:stretch>
-        </p:blipFill>
-        <p:spPr>
-          <a:xfrm>
-            <a:off x="845127" y="1340874"/>
-            <a:ext cx="3155469" cy="2366602"/>
-          </a:xfrm>
-          <a:prstGeom prst="rect">
-            <a:avLst/>
-          </a:prstGeom>
-        </p:spPr>
-      </p:pic>
-      <p:pic>
-        <p:nvPicPr>
-          <p:cNvPr id="4" name="Picture 3"/>
-          <p:cNvPicPr>
-            <a:picLocks noChangeAspect="1"/>
-          </p:cNvPicPr>
-          <p:nvPr/>
-        </p:nvPicPr>
-        <p:blipFill>
-          <a:blip r:embed="rId3">
-            <a:extLst>
-              <a:ext uri="{28A0092B-C50C-407E-A947-70E740481C1C}">
-                <a14:useLocalDpi xmlns:a14="http://schemas.microsoft.com/office/drawing/2010/main" val="0"/>
-              </a:ext>
-            </a:extLst>
-          </a:blip>
-          <a:stretch>
-            <a:fillRect/>
-          </a:stretch>
-        </p:blipFill>
-        <p:spPr>
-          <a:xfrm>
-            <a:off x="4222865" y="1340874"/>
-            <a:ext cx="3155470" cy="2366602"/>
-          </a:xfrm>
-          <a:prstGeom prst="rect">
-            <a:avLst/>
-          </a:prstGeom>
-        </p:spPr>
-      </p:pic>
-      <p:pic>
-        <p:nvPicPr>
-          <p:cNvPr id="8" name="Picture 7"/>
-          <p:cNvPicPr>
-            <a:picLocks noChangeAspect="1"/>
-          </p:cNvPicPr>
-          <p:nvPr/>
-        </p:nvPicPr>
-        <p:blipFill>
-          <a:blip r:embed="rId4">
-            <a:extLst>
-              <a:ext uri="{28A0092B-C50C-407E-A947-70E740481C1C}">
-                <a14:useLocalDpi xmlns:a14="http://schemas.microsoft.com/office/drawing/2010/main" val="0"/>
-              </a:ext>
-            </a:extLst>
-          </a:blip>
-          <a:stretch>
-            <a:fillRect/>
-          </a:stretch>
-        </p:blipFill>
-        <p:spPr>
-          <a:xfrm>
-            <a:off x="7711439" y="1315095"/>
-            <a:ext cx="3189842" cy="2392381"/>
-          </a:xfrm>
-          <a:prstGeom prst="rect">
-            <a:avLst/>
-          </a:prstGeom>
-        </p:spPr>
-      </p:pic>
-      <p:pic>
-        <p:nvPicPr>
-          <p:cNvPr id="10" name="Picture 9"/>
-          <p:cNvPicPr>
-            <a:picLocks noChangeAspect="1"/>
-          </p:cNvPicPr>
-          <p:nvPr/>
-        </p:nvPicPr>
-        <p:blipFill>
-          <a:blip r:embed="rId5">
-            <a:extLst>
-              <a:ext uri="{28A0092B-C50C-407E-A947-70E740481C1C}">
-                <a14:useLocalDpi xmlns:a14="http://schemas.microsoft.com/office/drawing/2010/main" val="0"/>
-              </a:ext>
-            </a:extLst>
-          </a:blip>
-          <a:stretch>
-            <a:fillRect/>
-          </a:stretch>
-        </p:blipFill>
-        <p:spPr>
-          <a:xfrm>
-            <a:off x="677163" y="4151081"/>
-            <a:ext cx="3183775" cy="2387831"/>
-          </a:xfrm>
-          <a:prstGeom prst="rect">
-            <a:avLst/>
-          </a:prstGeom>
-        </p:spPr>
-      </p:pic>
-      <p:pic>
-        <p:nvPicPr>
-          <p:cNvPr id="11" name="Picture 10"/>
-          <p:cNvPicPr>
-            <a:picLocks noChangeAspect="1"/>
-          </p:cNvPicPr>
-          <p:nvPr/>
-        </p:nvPicPr>
-        <p:blipFill>
-          <a:blip r:embed="rId6">
-            <a:extLst>
-              <a:ext uri="{28A0092B-C50C-407E-A947-70E740481C1C}">
-                <a14:useLocalDpi xmlns:a14="http://schemas.microsoft.com/office/drawing/2010/main" val="0"/>
-              </a:ext>
-            </a:extLst>
-          </a:blip>
-          <a:stretch>
-            <a:fillRect/>
-          </a:stretch>
-        </p:blipFill>
-        <p:spPr>
-          <a:xfrm>
-            <a:off x="4107530" y="4167706"/>
-            <a:ext cx="3153295" cy="2364971"/>
-          </a:xfrm>
-          <a:prstGeom prst="rect">
-            <a:avLst/>
-          </a:prstGeom>
-        </p:spPr>
-      </p:pic>
-      <p:pic>
-        <p:nvPicPr>
-          <p:cNvPr id="12" name="Picture 11"/>
-          <p:cNvPicPr>
-            <a:picLocks noChangeAspect="1"/>
-          </p:cNvPicPr>
-          <p:nvPr/>
-        </p:nvPicPr>
-        <p:blipFill>
-          <a:blip r:embed="rId7">
-            <a:extLst>
-              <a:ext uri="{28A0092B-C50C-407E-A947-70E740481C1C}">
-                <a14:useLocalDpi xmlns:a14="http://schemas.microsoft.com/office/drawing/2010/main" val="0"/>
-              </a:ext>
-            </a:extLst>
-          </a:blip>
-          <a:stretch>
-            <a:fillRect/>
-          </a:stretch>
-        </p:blipFill>
-        <p:spPr>
-          <a:xfrm>
-            <a:off x="7611091" y="4167706"/>
-            <a:ext cx="3175461" cy="2381596"/>
-          </a:xfrm>
-          <a:prstGeom prst="rect">
-            <a:avLst/>
-          </a:prstGeom>
-        </p:spPr>
-      </p:pic>
-    </p:spTree>
-    <p:extLst>
-      <p:ext uri="{BB962C8B-B14F-4D97-AF65-F5344CB8AC3E}">
-        <p14:creationId xmlns:p14="http://schemas.microsoft.com/office/powerpoint/2010/main" val="2331531519"/>
-      </p:ext>
-    </p:extLst>
-  </p:cSld>
-  <p:clrMapOvr>
-    <a:masterClrMapping/>
-  </p:clrMapOvr>
-</p:sld>
-</file>
-
-<file path=ppt/slides/slide9.xml><?xml version="1.0" encoding="utf-8"?>
-<p:sld xmlns:a="http://schemas.openxmlformats.org/drawingml/2006/main" xmlns:r="http://schemas.openxmlformats.org/officeDocument/2006/relationships" xmlns:p="http://schemas.openxmlformats.org/presentationml/2006/main">
-  <p:cSld>
-    <p:spTree>
-      <p:nvGrpSpPr>
-        <p:cNvPr id="1" name=""/>
-        <p:cNvGrpSpPr/>
-        <p:nvPr/>
-      </p:nvGrpSpPr>
-      <p:grpSpPr>
-        <a:xfrm>
-          <a:off x="0" y="0"/>
-          <a:ext cx="0" cy="0"/>
-          <a:chOff x="0" y="0"/>
-          <a:chExt cx="0" cy="0"/>
-        </a:xfrm>
-      </p:grpSpPr>
-      <p:sp>
-        <p:nvSpPr>
-          <p:cNvPr id="5" name="Slide Number Placeholder 4"/>
-          <p:cNvSpPr>
-            <a:spLocks noGrp="1"/>
-          </p:cNvSpPr>
-          <p:nvPr>
-            <p:ph type="sldNum" sz="quarter" idx="12"/>
-          </p:nvPr>
-        </p:nvSpPr>
-        <p:spPr/>
-        <p:txBody>
-          <a:bodyPr/>
-          <a:lstStyle/>
-          <a:p>
-            <a:fld id="{90F3C78D-3DB8-C64C-BA66-FD220ADFD702}" type="slidenum">
-              <a:rPr lang="en-US" smtClean="0"/>
-              <a:pPr/>
-              <a:t>9</a:t>
-            </a:fld>
-            <a:endParaRPr lang="en-US" dirty="0"/>
-          </a:p>
-        </p:txBody>
-      </p:sp>
-      <p:sp>
-        <p:nvSpPr>
-          <p:cNvPr id="6" name="TextBox 5"/>
-          <p:cNvSpPr txBox="1"/>
-          <p:nvPr/>
-        </p:nvSpPr>
-        <p:spPr>
-          <a:xfrm>
-            <a:off x="519221" y="205871"/>
-            <a:ext cx="10046255" cy="584775"/>
-          </a:xfrm>
-          <a:prstGeom prst="rect">
-            <a:avLst/>
-          </a:prstGeom>
-          <a:noFill/>
-        </p:spPr>
-        <p:txBody>
-          <a:bodyPr wrap="square" rtlCol="0">
-            <a:spAutoFit/>
-          </a:bodyPr>
-          <a:lstStyle/>
-          <a:p>
-            <a:r>
-              <a:rPr lang="en-US" sz="3200" dirty="0"/>
-              <a:t>Test Result: </a:t>
-            </a:r>
-            <a:r>
-              <a:rPr lang="en-US" sz="2800" dirty="0"/>
-              <a:t>Unconstrained </a:t>
-            </a:r>
-            <a:r>
-              <a:rPr lang="en-US" sz="2800" dirty="0" smtClean="0"/>
-              <a:t>Source </a:t>
-            </a:r>
-            <a:r>
-              <a:rPr lang="en-US" sz="2800" dirty="0"/>
-              <a:t>and </a:t>
-            </a:r>
-            <a:r>
-              <a:rPr lang="en-US" sz="2800" dirty="0" smtClean="0"/>
-              <a:t>Constrained Link Test</a:t>
-            </a:r>
-            <a:r>
-              <a:rPr lang="en-US" sz="3200" dirty="0" smtClean="0"/>
-              <a:t> </a:t>
-            </a:r>
-            <a:endParaRPr lang="en-US" sz="3200" dirty="0"/>
-          </a:p>
-        </p:txBody>
-      </p:sp>
-      <p:sp>
-        <p:nvSpPr>
-          <p:cNvPr id="7" name="Rectangle 6"/>
-          <p:cNvSpPr/>
-          <p:nvPr/>
-        </p:nvSpPr>
-        <p:spPr>
-          <a:xfrm>
-            <a:off x="968107" y="3549263"/>
-            <a:ext cx="1092671" cy="369332"/>
-          </a:xfrm>
-          <a:prstGeom prst="rect">
-            <a:avLst/>
-          </a:prstGeom>
-        </p:spPr>
-        <p:txBody>
-          <a:bodyPr wrap="none">
-            <a:spAutoFit/>
-          </a:bodyPr>
-          <a:lstStyle/>
-          <a:p>
-            <a:r>
-              <a:rPr lang="en-US" dirty="0"/>
-              <a:t>2</a:t>
-            </a:r>
-            <a:r>
-              <a:rPr lang="en-US" dirty="0" smtClean="0"/>
-              <a:t>.    LEAP:</a:t>
-            </a:r>
-            <a:endParaRPr lang="en-US" dirty="0"/>
-          </a:p>
-        </p:txBody>
-      </p:sp>
-      <p:pic>
-        <p:nvPicPr>
-          <p:cNvPr id="3" name="Picture 2"/>
-          <p:cNvPicPr>
-            <a:picLocks noChangeAspect="1"/>
-          </p:cNvPicPr>
-          <p:nvPr/>
-        </p:nvPicPr>
-        <p:blipFill>
-          <a:blip r:embed="rId2">
-            <a:extLst>
-              <a:ext uri="{28A0092B-C50C-407E-A947-70E740481C1C}">
-                <a14:useLocalDpi xmlns:a14="http://schemas.microsoft.com/office/drawing/2010/main" val="0"/>
-              </a:ext>
-            </a:extLst>
-          </a:blip>
-          <a:stretch>
-            <a:fillRect/>
-          </a:stretch>
-        </p:blipFill>
-        <p:spPr>
-          <a:xfrm>
-            <a:off x="590445" y="790646"/>
-            <a:ext cx="3208351" cy="2406263"/>
-          </a:xfrm>
-          <a:prstGeom prst="rect">
-            <a:avLst/>
-          </a:prstGeom>
-        </p:spPr>
-      </p:pic>
-      <p:pic>
-        <p:nvPicPr>
-          <p:cNvPr id="9" name="Picture 8"/>
-          <p:cNvPicPr>
-            <a:picLocks noChangeAspect="1"/>
-          </p:cNvPicPr>
-          <p:nvPr/>
-        </p:nvPicPr>
-        <p:blipFill>
-          <a:blip r:embed="rId3">
-            <a:extLst>
-              <a:ext uri="{28A0092B-C50C-407E-A947-70E740481C1C}">
-                <a14:useLocalDpi xmlns:a14="http://schemas.microsoft.com/office/drawing/2010/main" val="0"/>
-              </a:ext>
-            </a:extLst>
-          </a:blip>
-          <a:stretch>
-            <a:fillRect/>
-          </a:stretch>
-        </p:blipFill>
-        <p:spPr>
-          <a:xfrm>
-            <a:off x="590445" y="4156275"/>
-            <a:ext cx="3117031" cy="2337773"/>
-          </a:xfrm>
-          <a:prstGeom prst="rect">
-            <a:avLst/>
-          </a:prstGeom>
-        </p:spPr>
-      </p:pic>
-      <p:pic>
-        <p:nvPicPr>
-          <p:cNvPr id="13" name="Picture 12"/>
-          <p:cNvPicPr>
-            <a:picLocks noChangeAspect="1"/>
-          </p:cNvPicPr>
-          <p:nvPr/>
-        </p:nvPicPr>
-        <p:blipFill>
-          <a:blip r:embed="rId4">
-            <a:extLst>
-              <a:ext uri="{28A0092B-C50C-407E-A947-70E740481C1C}">
-                <a14:useLocalDpi xmlns:a14="http://schemas.microsoft.com/office/drawing/2010/main" val="0"/>
-              </a:ext>
-            </a:extLst>
-          </a:blip>
-          <a:stretch>
-            <a:fillRect/>
-          </a:stretch>
-        </p:blipFill>
-        <p:spPr>
-          <a:xfrm>
-            <a:off x="3948546" y="4081548"/>
-            <a:ext cx="3216666" cy="2412499"/>
-          </a:xfrm>
-          <a:prstGeom prst="rect">
-            <a:avLst/>
-          </a:prstGeom>
-        </p:spPr>
-      </p:pic>
-      <p:pic>
-        <p:nvPicPr>
-          <p:cNvPr id="14" name="Picture 13"/>
-          <p:cNvPicPr>
-            <a:picLocks noChangeAspect="1"/>
-          </p:cNvPicPr>
-          <p:nvPr/>
-        </p:nvPicPr>
-        <p:blipFill>
-          <a:blip r:embed="rId5">
-            <a:extLst>
-              <a:ext uri="{28A0092B-C50C-407E-A947-70E740481C1C}">
-                <a14:useLocalDpi xmlns:a14="http://schemas.microsoft.com/office/drawing/2010/main" val="0"/>
-              </a:ext>
-            </a:extLst>
-          </a:blip>
-          <a:stretch>
-            <a:fillRect/>
-          </a:stretch>
-        </p:blipFill>
-        <p:spPr>
-          <a:xfrm>
-            <a:off x="7406282" y="4081548"/>
-            <a:ext cx="3216666" cy="2412499"/>
-          </a:xfrm>
-          <a:prstGeom prst="rect">
-            <a:avLst/>
-          </a:prstGeom>
-        </p:spPr>
-      </p:pic>
-    </p:spTree>
-    <p:extLst>
-      <p:ext uri="{BB962C8B-B14F-4D97-AF65-F5344CB8AC3E}">
-        <p14:creationId xmlns:p14="http://schemas.microsoft.com/office/powerpoint/2010/main" val="3165310631"/>
-      </p:ext>
-    </p:extLst>
-  </p:cSld>
-  <p:clrMapOvr>
-    <a:masterClrMapping/>
-  </p:clrMapOvr>
 </p:sld>
 </file>
 

</xml_diff>

<commit_message>
summary of WEAP and LEAP time step control test is added
</commit_message>
<xml_diff>
--- a/Step_Control_Test/WEAP_LEAP_Time_Step_Control.pptx
+++ b/Step_Control_Test/WEAP_LEAP_Time_Step_Control.pptx
@@ -225,7 +225,7 @@
           <a:p>
             <a:fld id="{C0FD841D-3CEA-41B6-B502-4A06C24D4491}" type="datetimeFigureOut">
               <a:rPr lang="en-US" smtClean="0"/>
-              <a:t>9/29/2019</a:t>
+              <a:t>10/2/2019</a:t>
             </a:fld>
             <a:endParaRPr lang="en-US"/>
           </a:p>
@@ -538,7 +538,7 @@
               </a14:hiddenFill>
             </a:ext>
             <a:ext uri="{FAA26D3D-D897-4be2-8F04-BA451C77F1D7}">
-              <ma14:placeholderFlag xmlns="" xmlns:ma14="http://schemas.microsoft.com/office/mac/drawingml/2011/main" val="1"/>
+              <ma14:placeholderFlag xmlns:ma14="http://schemas.microsoft.com/office/mac/drawingml/2011/main" xmlns="" val="1"/>
             </a:ext>
           </a:extLst>
         </p:spPr>
@@ -574,7 +574,7 @@
               </a14:hiddenLine>
             </a:ext>
             <a:ext uri="{FAA26D3D-D897-4be2-8F04-BA451C77F1D7}">
-              <ma14:placeholderFlag xmlns="" xmlns:ma14="http://schemas.microsoft.com/office/mac/drawingml/2011/main" val="1"/>
+              <ma14:placeholderFlag xmlns:ma14="http://schemas.microsoft.com/office/mac/drawingml/2011/main" xmlns="" val="1"/>
             </a:ext>
           </a:extLst>
         </p:spPr>
@@ -7616,7 +7616,7 @@
         </p:blipFill>
         <p:spPr>
           <a:xfrm>
-            <a:off x="102062" y="1596044"/>
+            <a:off x="143626" y="1668150"/>
             <a:ext cx="5457630" cy="3835631"/>
           </a:xfrm>
           <a:prstGeom prst="rect">
@@ -7682,11 +7682,7 @@
             </a:r>
             <a:r>
               <a:rPr lang="en-US" sz="2800" dirty="0" smtClean="0"/>
-              <a:t>Unconstrained </a:t>
-            </a:r>
-            <a:r>
-              <a:rPr lang="en-US" sz="2800" dirty="0" smtClean="0"/>
-              <a:t>Source </a:t>
+              <a:t>Unconstrained Source </a:t>
             </a:r>
             <a:r>
               <a:rPr lang="en-US" sz="2800" dirty="0"/>

</xml_diff>